<commit_message>
Corrected the dependent variable in vis_and_analysis_student_demo_template
</commit_message>
<xml_diff>
--- a/vis_and_analysis_student_demo_template.pptx
+++ b/vis_and_analysis_student_demo_template.pptx
@@ -1,30 +1,30 @@
 
 <file path=ppt/presentation.xml><?xml version="1.0" encoding="utf-8"?>
-<p:presentation xmlns:a="http://schemas.openxmlformats.org/drawingml/2006/main" xmlns:r="http://schemas.openxmlformats.org/officeDocument/2006/relationships" xmlns:p="http://schemas.openxmlformats.org/presentationml/2006/main" xmlns:m="http://schemas.openxmlformats.org/officeDocument/2006/math" xmlns:w="http://schemas.openxmlformats.org/wordprocessingml/2006/main" saveSubsetFonts="1">
+<p:presentation xmlns:a="http://schemas.openxmlformats.org/drawingml/2006/main" xmlns:r="http://schemas.openxmlformats.org/officeDocument/2006/relationships" xmlns:p="http://schemas.openxmlformats.org/presentationml/2006/main" saveSubsetFonts="1">
   <p:sldMasterIdLst>
     <p:sldMasterId id="2147483648" r:id="rId4"/>
   </p:sldMasterIdLst>
   <p:notesMasterIdLst>
-    <p:notesMasterId r:id="rId17"/>
+    <p:notesMasterId r:id="rId15"/>
   </p:notesMasterIdLst>
   <p:sldIdLst>
-    <p:sldId id="256" r:id="rId7"/>
-    <p:sldId id="257" r:id="rId8"/>
-    <p:sldId id="258" r:id="rId9"/>
-    <p:sldId id="259" r:id="rId10"/>
-    <p:sldId id="260" r:id="rId11"/>
-    <p:sldId id="261" r:id="rId12"/>
-    <p:sldId id="262" r:id="rId13"/>
-    <p:sldId id="263" r:id="rId14"/>
-    <p:sldId id="264" r:id="rId15"/>
-    <p:sldId id="265" r:id="rId16"/>
+    <p:sldId id="256" r:id="rId5"/>
+    <p:sldId id="257" r:id="rId6"/>
+    <p:sldId id="258" r:id="rId7"/>
+    <p:sldId id="259" r:id="rId8"/>
+    <p:sldId id="260" r:id="rId9"/>
+    <p:sldId id="261" r:id="rId10"/>
+    <p:sldId id="262" r:id="rId11"/>
+    <p:sldId id="263" r:id="rId12"/>
+    <p:sldId id="264" r:id="rId13"/>
+    <p:sldId id="265" r:id="rId14"/>
   </p:sldIdLst>
   <p:sldSz cx="12192000" cy="6858000"/>
   <p:notesSz cx="6858000" cy="9144000"/>
   <p:custDataLst>
+    <p:custData r:id="rId3"/>
     <p:custData r:id="rId1"/>
     <p:custData r:id="rId2"/>
-    <p:custData r:id="rId3"/>
   </p:custDataLst>
   <p:defaultTextStyle>
     <a:defPPr>
@@ -121,12 +121,43 @@
       </a:defRPr>
     </a:lvl9pPr>
   </p:defaultTextStyle>
+  <p:extLst>
+    <p:ext uri="{EFAFB233-063F-42B5-8137-9DF3F51BA10A}">
+      <p15:sldGuideLst xmlns:p15="http://schemas.microsoft.com/office/powerpoint/2012/main">
+        <p15:guide id="1" orient="horz" pos="2160">
+          <p15:clr>
+            <a:srgbClr val="A4A3A4"/>
+          </p15:clr>
+        </p15:guide>
+        <p15:guide id="2" pos="3840">
+          <p15:clr>
+            <a:srgbClr val="A4A3A4"/>
+          </p15:clr>
+        </p15:guide>
+        <p15:guide id="3" orient="horz" pos="3249">
+          <p15:clr>
+            <a:srgbClr val="A4A3A4"/>
+          </p15:clr>
+        </p15:guide>
+        <p15:guide id="4" pos="7068">
+          <p15:clr>
+            <a:srgbClr val="A4A3A4"/>
+          </p15:clr>
+        </p15:guide>
+        <p15:guide id="5" orient="horz" pos="1380">
+          <p15:clr>
+            <a:srgbClr val="A4A3A4"/>
+          </p15:clr>
+        </p15:guide>
+      </p15:sldGuideLst>
+    </p:ext>
+  </p:extLst>
 </p:presentation>
 </file>
 
 <file path=ppt/notesMasters/notesMaster1.xml><?xml version="1.0" encoding="utf-8"?>
 <p:notesMaster xmlns:a="http://schemas.openxmlformats.org/drawingml/2006/main" xmlns:r="http://schemas.openxmlformats.org/officeDocument/2006/relationships" xmlns:p="http://schemas.openxmlformats.org/presentationml/2006/main">
-  <p:cSld name="">
+  <p:cSld>
     <p:bg>
       <p:bgRef idx="1001">
         <a:schemeClr val="bg1"/>
@@ -212,7 +243,7 @@
             </a:pPr>
             <a:fld id="{8E359C8A-39F6-4045-9163-4042C4C26B15}" type="datetimeFigureOut">
               <a:rPr lang="en-GB"/>
-              <a:t>17/11/2025</a:t>
+              <a:t>01/12/2025</a:t>
             </a:fld>
             <a:endParaRPr lang="en-GB"/>
           </a:p>
@@ -222,7 +253,7 @@
         <p:nvSpPr>
           <p:cNvPr id="174513422" name="Slide Image Placeholder 3"/>
           <p:cNvSpPr>
-            <a:spLocks noChangeAspect="1" noGrp="1" noRot="1"/>
+            <a:spLocks noGrp="1" noRot="1" noChangeAspect="1"/>
           </p:cNvSpPr>
           <p:nvPr>
             <p:ph type="sldImg" idx="2"/>
@@ -499,8 +530,8 @@
 </file>
 
 <file path=ppt/notesSlides/notesSlide1.xml><?xml version="1.0" encoding="utf-8"?>
-<p:notes xmlns:a="http://schemas.openxmlformats.org/drawingml/2006/main" xmlns:r="http://schemas.openxmlformats.org/officeDocument/2006/relationships" xmlns:p="http://schemas.openxmlformats.org/presentationml/2006/main" xmlns:m="http://schemas.openxmlformats.org/officeDocument/2006/math" xmlns:w="http://schemas.openxmlformats.org/wordprocessingml/2006/main">
-  <p:cSld name="">
+<p:notes xmlns:a="http://schemas.openxmlformats.org/drawingml/2006/main" xmlns:r="http://schemas.openxmlformats.org/officeDocument/2006/relationships" xmlns:p="http://schemas.openxmlformats.org/presentationml/2006/main">
+  <p:cSld>
     <p:spTree>
       <p:nvGrpSpPr>
         <p:cNvPr id="1" name=""/>
@@ -519,7 +550,7 @@
         <p:nvSpPr>
           <p:cNvPr id="1093187854" name="Slide Image Placeholder 1"/>
           <p:cNvSpPr>
-            <a:spLocks noChangeAspect="1" noGrp="1" noRot="1"/>
+            <a:spLocks noGrp="1" noRot="1" noChangeAspect="1"/>
           </p:cNvSpPr>
           <p:nvPr>
             <p:ph type="sldImg"/>
@@ -569,7 +600,7 @@
             </a:pPr>
             <a:fld id="{F2D3F479-D4AD-35C2-04D0-AFCD5C6F5319}" type="slidenum">
               <a:rPr/>
-              <a:t/>
+              <a:t>1</a:t>
             </a:fld>
             <a:endParaRPr/>
           </a:p>
@@ -584,8 +615,8 @@
 </file>
 
 <file path=ppt/notesSlides/notesSlide10.xml><?xml version="1.0" encoding="utf-8"?>
-<p:notes xmlns:a="http://schemas.openxmlformats.org/drawingml/2006/main" xmlns:r="http://schemas.openxmlformats.org/officeDocument/2006/relationships" xmlns:p="http://schemas.openxmlformats.org/presentationml/2006/main" xmlns:m="http://schemas.openxmlformats.org/officeDocument/2006/math" xmlns:w="http://schemas.openxmlformats.org/wordprocessingml/2006/main">
-  <p:cSld name="">
+<p:notes xmlns:a="http://schemas.openxmlformats.org/drawingml/2006/main" xmlns:r="http://schemas.openxmlformats.org/officeDocument/2006/relationships" xmlns:p="http://schemas.openxmlformats.org/presentationml/2006/main">
+  <p:cSld>
     <p:spTree>
       <p:nvGrpSpPr>
         <p:cNvPr id="1" name=""/>
@@ -604,7 +635,7 @@
         <p:nvSpPr>
           <p:cNvPr id="964257296" name="PlaceHolder 1"/>
           <p:cNvSpPr>
-            <a:spLocks noChangeAspect="1" noGrp="1" noRot="1"/>
+            <a:spLocks noGrp="1" noRot="1" noChangeAspect="1"/>
           </p:cNvSpPr>
           <p:nvPr>
             <p:ph type="sldImg"/>
@@ -689,7 +720,7 @@
               <a:rPr lang="en-GB" sz="1200" b="0" strike="noStrike" spc="-1">
                 <a:latin typeface="Times New Roman"/>
               </a:rPr>
-              <a:t>13</a:t>
+              <a:t>10</a:t>
             </a:fld>
             <a:endParaRPr lang="en-US" sz="1200" b="0" strike="noStrike" spc="-1">
               <a:latin typeface="Times New Roman"/>
@@ -706,8 +737,8 @@
 </file>
 
 <file path=ppt/notesSlides/notesSlide2.xml><?xml version="1.0" encoding="utf-8"?>
-<p:notes xmlns:a="http://schemas.openxmlformats.org/drawingml/2006/main" xmlns:r="http://schemas.openxmlformats.org/officeDocument/2006/relationships" xmlns:p="http://schemas.openxmlformats.org/presentationml/2006/main" xmlns:m="http://schemas.openxmlformats.org/officeDocument/2006/math" xmlns:w="http://schemas.openxmlformats.org/wordprocessingml/2006/main">
-  <p:cSld name="">
+<p:notes xmlns:a="http://schemas.openxmlformats.org/drawingml/2006/main" xmlns:r="http://schemas.openxmlformats.org/officeDocument/2006/relationships" xmlns:p="http://schemas.openxmlformats.org/presentationml/2006/main">
+  <p:cSld>
     <p:spTree>
       <p:nvGrpSpPr>
         <p:cNvPr id="1" name=""/>
@@ -726,7 +757,7 @@
         <p:nvSpPr>
           <p:cNvPr id="505214214" name="Slide Image Placeholder 1"/>
           <p:cNvSpPr>
-            <a:spLocks noChangeAspect="1" noGrp="1" noRot="1"/>
+            <a:spLocks noGrp="1" noRot="1" noChangeAspect="1"/>
           </p:cNvSpPr>
           <p:nvPr>
             <p:ph type="sldImg"/>
@@ -776,7 +807,7 @@
             </a:pPr>
             <a:fld id="{F31DCE6A-C64C-AF04-CD13-525E4562A1E0}" type="slidenum">
               <a:rPr/>
-              <a:t/>
+              <a:t>2</a:t>
             </a:fld>
             <a:endParaRPr/>
           </a:p>
@@ -791,8 +822,8 @@
 </file>
 
 <file path=ppt/notesSlides/notesSlide3.xml><?xml version="1.0" encoding="utf-8"?>
-<p:notes xmlns:a="http://schemas.openxmlformats.org/drawingml/2006/main" xmlns:r="http://schemas.openxmlformats.org/officeDocument/2006/relationships" xmlns:p="http://schemas.openxmlformats.org/presentationml/2006/main" xmlns:m="http://schemas.openxmlformats.org/officeDocument/2006/math" xmlns:w="http://schemas.openxmlformats.org/wordprocessingml/2006/main">
-  <p:cSld name="">
+<p:notes xmlns:a="http://schemas.openxmlformats.org/drawingml/2006/main" xmlns:r="http://schemas.openxmlformats.org/officeDocument/2006/relationships" xmlns:p="http://schemas.openxmlformats.org/presentationml/2006/main">
+  <p:cSld>
     <p:spTree>
       <p:nvGrpSpPr>
         <p:cNvPr id="1" name=""/>
@@ -811,7 +842,7 @@
         <p:nvSpPr>
           <p:cNvPr id="1525982051" name="Slide Image Placeholder 1"/>
           <p:cNvSpPr>
-            <a:spLocks noChangeAspect="1" noGrp="1" noRot="1"/>
+            <a:spLocks noGrp="1" noRot="1" noChangeAspect="1"/>
           </p:cNvSpPr>
           <p:nvPr>
             <p:ph type="sldImg"/>
@@ -861,7 +892,7 @@
             </a:pPr>
             <a:fld id="{30370952-48CC-46D7-9FCD-59FAD40CC025}" type="slidenum">
               <a:rPr lang="en-GB"/>
-              <a:t>5</a:t>
+              <a:t>3</a:t>
             </a:fld>
             <a:endParaRPr lang="en-GB"/>
           </a:p>
@@ -876,8 +907,8 @@
 </file>
 
 <file path=ppt/notesSlides/notesSlide4.xml><?xml version="1.0" encoding="utf-8"?>
-<p:notes xmlns:a="http://schemas.openxmlformats.org/drawingml/2006/main" xmlns:r="http://schemas.openxmlformats.org/officeDocument/2006/relationships" xmlns:p="http://schemas.openxmlformats.org/presentationml/2006/main" xmlns:m="http://schemas.openxmlformats.org/officeDocument/2006/math" xmlns:w="http://schemas.openxmlformats.org/wordprocessingml/2006/main">
-  <p:cSld name="">
+<p:notes xmlns:a="http://schemas.openxmlformats.org/drawingml/2006/main" xmlns:r="http://schemas.openxmlformats.org/officeDocument/2006/relationships" xmlns:p="http://schemas.openxmlformats.org/presentationml/2006/main">
+  <p:cSld>
     <p:spTree>
       <p:nvGrpSpPr>
         <p:cNvPr id="1" name=""/>
@@ -896,7 +927,7 @@
         <p:nvSpPr>
           <p:cNvPr id="1464836044" name="Slide Image Placeholder 1"/>
           <p:cNvSpPr>
-            <a:spLocks noChangeAspect="1" noGrp="1" noRot="1"/>
+            <a:spLocks noGrp="1" noRot="1" noChangeAspect="1"/>
           </p:cNvSpPr>
           <p:nvPr>
             <p:ph type="sldImg"/>
@@ -946,7 +977,7 @@
             </a:pPr>
             <a:fld id="{CE90AB3D-3726-6CE0-7A45-7E6A34DAD8E0}" type="slidenum">
               <a:rPr/>
-              <a:t/>
+              <a:t>4</a:t>
             </a:fld>
             <a:endParaRPr/>
           </a:p>
@@ -961,8 +992,8 @@
 </file>
 
 <file path=ppt/notesSlides/notesSlide5.xml><?xml version="1.0" encoding="utf-8"?>
-<p:notes xmlns:a="http://schemas.openxmlformats.org/drawingml/2006/main" xmlns:r="http://schemas.openxmlformats.org/officeDocument/2006/relationships" xmlns:p="http://schemas.openxmlformats.org/presentationml/2006/main" xmlns:m="http://schemas.openxmlformats.org/officeDocument/2006/math" xmlns:w="http://schemas.openxmlformats.org/wordprocessingml/2006/main">
-  <p:cSld name="">
+<p:notes xmlns:a="http://schemas.openxmlformats.org/drawingml/2006/main" xmlns:r="http://schemas.openxmlformats.org/officeDocument/2006/relationships" xmlns:p="http://schemas.openxmlformats.org/presentationml/2006/main">
+  <p:cSld>
     <p:spTree>
       <p:nvGrpSpPr>
         <p:cNvPr id="1" name=""/>
@@ -981,7 +1012,7 @@
         <p:nvSpPr>
           <p:cNvPr id="2016080378" name="Slide Image Placeholder 1"/>
           <p:cNvSpPr>
-            <a:spLocks noChangeAspect="1" noGrp="1" noRot="1"/>
+            <a:spLocks noGrp="1" noRot="1" noChangeAspect="1"/>
           </p:cNvSpPr>
           <p:nvPr>
             <p:ph type="sldImg"/>
@@ -1031,7 +1062,7 @@
             </a:pPr>
             <a:fld id="{0AAE567D-FD44-67CB-C7BF-67A50E23FC94}" type="slidenum">
               <a:rPr/>
-              <a:t/>
+              <a:t>5</a:t>
             </a:fld>
             <a:endParaRPr/>
           </a:p>
@@ -1046,8 +1077,8 @@
 </file>
 
 <file path=ppt/notesSlides/notesSlide6.xml><?xml version="1.0" encoding="utf-8"?>
-<p:notes xmlns:a="http://schemas.openxmlformats.org/drawingml/2006/main" xmlns:r="http://schemas.openxmlformats.org/officeDocument/2006/relationships" xmlns:p="http://schemas.openxmlformats.org/presentationml/2006/main" xmlns:m="http://schemas.openxmlformats.org/officeDocument/2006/math" xmlns:w="http://schemas.openxmlformats.org/wordprocessingml/2006/main">
-  <p:cSld name="">
+<p:notes xmlns:a="http://schemas.openxmlformats.org/drawingml/2006/main" xmlns:r="http://schemas.openxmlformats.org/officeDocument/2006/relationships" xmlns:p="http://schemas.openxmlformats.org/presentationml/2006/main">
+  <p:cSld>
     <p:spTree>
       <p:nvGrpSpPr>
         <p:cNvPr id="1" name=""/>
@@ -1066,7 +1097,7 @@
         <p:nvSpPr>
           <p:cNvPr id="1896536183" name="Slide Image Placeholder 1"/>
           <p:cNvSpPr>
-            <a:spLocks noChangeAspect="1" noGrp="1" noRot="1"/>
+            <a:spLocks noGrp="1" noRot="1" noChangeAspect="1"/>
           </p:cNvSpPr>
           <p:nvPr>
             <p:ph type="sldImg"/>
@@ -1116,7 +1147,7 @@
             </a:pPr>
             <a:fld id="{DCDCC23D-F539-AF3A-9DA8-D4139A94F264}" type="slidenum">
               <a:rPr/>
-              <a:t/>
+              <a:t>6</a:t>
             </a:fld>
             <a:endParaRPr/>
           </a:p>
@@ -1131,8 +1162,8 @@
 </file>
 
 <file path=ppt/notesSlides/notesSlide7.xml><?xml version="1.0" encoding="utf-8"?>
-<p:notes xmlns:a="http://schemas.openxmlformats.org/drawingml/2006/main" xmlns:r="http://schemas.openxmlformats.org/officeDocument/2006/relationships" xmlns:p="http://schemas.openxmlformats.org/presentationml/2006/main" xmlns:m="http://schemas.openxmlformats.org/officeDocument/2006/math" xmlns:w="http://schemas.openxmlformats.org/wordprocessingml/2006/main">
-  <p:cSld name="">
+<p:notes xmlns:a="http://schemas.openxmlformats.org/drawingml/2006/main" xmlns:r="http://schemas.openxmlformats.org/officeDocument/2006/relationships" xmlns:p="http://schemas.openxmlformats.org/presentationml/2006/main">
+  <p:cSld>
     <p:spTree>
       <p:nvGrpSpPr>
         <p:cNvPr id="1" name=""/>
@@ -1151,7 +1182,7 @@
         <p:nvSpPr>
           <p:cNvPr id="1793534028" name="PlaceHolder 1"/>
           <p:cNvSpPr>
-            <a:spLocks noChangeAspect="1" noGrp="1" noRot="1"/>
+            <a:spLocks noGrp="1" noRot="1" noChangeAspect="1"/>
           </p:cNvSpPr>
           <p:nvPr>
             <p:ph type="sldImg"/>
@@ -1236,7 +1267,7 @@
               <a:rPr lang="en-GB" sz="1200" b="0" strike="noStrike" spc="-1">
                 <a:latin typeface="Times New Roman"/>
               </a:rPr>
-              <a:t>10</a:t>
+              <a:t>7</a:t>
             </a:fld>
             <a:endParaRPr lang="en-US" sz="1200" b="0" strike="noStrike" spc="-1">
               <a:latin typeface="Times New Roman"/>
@@ -1253,8 +1284,8 @@
 </file>
 
 <file path=ppt/notesSlides/notesSlide8.xml><?xml version="1.0" encoding="utf-8"?>
-<p:notes xmlns:a="http://schemas.openxmlformats.org/drawingml/2006/main" xmlns:r="http://schemas.openxmlformats.org/officeDocument/2006/relationships" xmlns:p="http://schemas.openxmlformats.org/presentationml/2006/main" xmlns:m="http://schemas.openxmlformats.org/officeDocument/2006/math" xmlns:w="http://schemas.openxmlformats.org/wordprocessingml/2006/main">
-  <p:cSld name="">
+<p:notes xmlns:a="http://schemas.openxmlformats.org/drawingml/2006/main" xmlns:r="http://schemas.openxmlformats.org/officeDocument/2006/relationships" xmlns:p="http://schemas.openxmlformats.org/presentationml/2006/main">
+  <p:cSld>
     <p:spTree>
       <p:nvGrpSpPr>
         <p:cNvPr id="1" name=""/>
@@ -1273,7 +1304,7 @@
         <p:nvSpPr>
           <p:cNvPr id="848156306" name="Slide Image Placeholder 1"/>
           <p:cNvSpPr>
-            <a:spLocks noChangeAspect="1" noGrp="1" noRot="1"/>
+            <a:spLocks noGrp="1" noRot="1" noChangeAspect="1"/>
           </p:cNvSpPr>
           <p:nvPr>
             <p:ph type="sldImg"/>
@@ -1323,7 +1354,7 @@
             </a:pPr>
             <a:fld id="{30511EA8-1CB8-9E57-2BEB-04B7B218F467}" type="slidenum">
               <a:rPr/>
-              <a:t/>
+              <a:t>8</a:t>
             </a:fld>
             <a:endParaRPr/>
           </a:p>
@@ -1338,8 +1369,8 @@
 </file>
 
 <file path=ppt/notesSlides/notesSlide9.xml><?xml version="1.0" encoding="utf-8"?>
-<p:notes xmlns:a="http://schemas.openxmlformats.org/drawingml/2006/main" xmlns:r="http://schemas.openxmlformats.org/officeDocument/2006/relationships" xmlns:p="http://schemas.openxmlformats.org/presentationml/2006/main" xmlns:m="http://schemas.openxmlformats.org/officeDocument/2006/math" xmlns:w="http://schemas.openxmlformats.org/wordprocessingml/2006/main">
-  <p:cSld name="">
+<p:notes xmlns:a="http://schemas.openxmlformats.org/drawingml/2006/main" xmlns:r="http://schemas.openxmlformats.org/officeDocument/2006/relationships" xmlns:p="http://schemas.openxmlformats.org/presentationml/2006/main">
+  <p:cSld>
     <p:spTree>
       <p:nvGrpSpPr>
         <p:cNvPr id="1" name=""/>
@@ -1358,7 +1389,7 @@
         <p:nvSpPr>
           <p:cNvPr id="1589890552" name="PlaceHolder 1"/>
           <p:cNvSpPr>
-            <a:spLocks noChangeAspect="1" noGrp="1" noRot="1"/>
+            <a:spLocks noGrp="1" noRot="1" noChangeAspect="1"/>
           </p:cNvSpPr>
           <p:nvPr>
             <p:ph type="sldImg"/>
@@ -1443,7 +1474,7 @@
               <a:rPr lang="en-GB" sz="1200" b="0" strike="noStrike" spc="-1">
                 <a:latin typeface="Times New Roman"/>
               </a:rPr>
-              <a:t>12</a:t>
+              <a:t>9</a:t>
             </a:fld>
             <a:endParaRPr lang="en-US" sz="1200" b="0" strike="noStrike" spc="-1">
               <a:latin typeface="Times New Roman"/>
@@ -1460,16 +1491,17 @@
 </file>
 
 <file path=ppt/slideLayouts/slideLayout1.xml><?xml version="1.0" encoding="utf-8"?>
-<p:sldLayout xmlns:a="http://schemas.openxmlformats.org/drawingml/2006/main" xmlns:r="http://schemas.openxmlformats.org/officeDocument/2006/relationships" xmlns:p="http://schemas.openxmlformats.org/presentationml/2006/main" xmlns:m="http://schemas.openxmlformats.org/officeDocument/2006/math" xmlns:w="http://schemas.openxmlformats.org/wordprocessingml/2006/main" matchingName="" preserve="1" showMasterPhAnim="0" showMasterSp="1" userDrawn="1">
+<p:sldLayout xmlns:a="http://schemas.openxmlformats.org/drawingml/2006/main" xmlns:r="http://schemas.openxmlformats.org/officeDocument/2006/relationships" xmlns:p="http://schemas.openxmlformats.org/presentationml/2006/main" showMasterPhAnim="0" preserve="1" userDrawn="1">
   <p:cSld name="Cover">
     <p:bg>
-      <p:bgPr shadeToTitle="0">
+      <p:bgPr>
         <a:blipFill>
           <a:blip r:embed="rId2">
             <a:lum/>
           </a:blip>
           <a:stretch/>
         </a:blipFill>
+        <a:effectLst/>
       </p:bgPr>
     </p:bg>
     <p:spTree>
@@ -1517,13 +1549,14 @@
 </file>
 
 <file path=ppt/slideLayouts/slideLayout10.xml><?xml version="1.0" encoding="utf-8"?>
-<p:sldLayout xmlns:a="http://schemas.openxmlformats.org/drawingml/2006/main" xmlns:r="http://schemas.openxmlformats.org/officeDocument/2006/relationships" xmlns:p="http://schemas.openxmlformats.org/presentationml/2006/main" xmlns:m="http://schemas.openxmlformats.org/officeDocument/2006/math" xmlns:w="http://schemas.openxmlformats.org/wordprocessingml/2006/main" matchingName="" preserve="1" showMasterPhAnim="0" showMasterSp="1" userDrawn="1">
+<p:sldLayout xmlns:a="http://schemas.openxmlformats.org/drawingml/2006/main" xmlns:r="http://schemas.openxmlformats.org/officeDocument/2006/relationships" xmlns:p="http://schemas.openxmlformats.org/presentationml/2006/main" showMasterPhAnim="0" preserve="1" userDrawn="1">
   <p:cSld name="Full Bleed Image">
     <p:bg>
-      <p:bgPr shadeToTitle="0">
+      <p:bgPr>
         <a:solidFill>
           <a:schemeClr val="accent1"/>
         </a:solidFill>
+        <a:effectLst/>
       </p:bgPr>
     </p:bg>
     <p:spTree>
@@ -1588,13 +1621,14 @@
 </file>
 
 <file path=ppt/slideLayouts/slideLayout11.xml><?xml version="1.0" encoding="utf-8"?>
-<p:sldLayout xmlns:a="http://schemas.openxmlformats.org/drawingml/2006/main" xmlns:r="http://schemas.openxmlformats.org/officeDocument/2006/relationships" xmlns:p="http://schemas.openxmlformats.org/presentationml/2006/main" xmlns:m="http://schemas.openxmlformats.org/officeDocument/2006/math" xmlns:w="http://schemas.openxmlformats.org/wordprocessingml/2006/main" matchingName="" preserve="1" showMasterPhAnim="0" showMasterSp="1" userDrawn="1">
+<p:sldLayout xmlns:a="http://schemas.openxmlformats.org/drawingml/2006/main" xmlns:r="http://schemas.openxmlformats.org/officeDocument/2006/relationships" xmlns:p="http://schemas.openxmlformats.org/presentationml/2006/main" showMasterPhAnim="0" preserve="1" userDrawn="1">
   <p:cSld name="1_Video">
     <p:bg>
-      <p:bgPr shadeToTitle="0">
+      <p:bgPr>
         <a:solidFill>
           <a:schemeClr val="accent1"/>
         </a:solidFill>
+        <a:effectLst/>
       </p:bgPr>
     </p:bg>
     <p:spTree>
@@ -1653,13 +1687,14 @@
 </file>
 
 <file path=ppt/slideLayouts/slideLayout12.xml><?xml version="1.0" encoding="utf-8"?>
-<p:sldLayout xmlns:a="http://schemas.openxmlformats.org/drawingml/2006/main" xmlns:r="http://schemas.openxmlformats.org/officeDocument/2006/relationships" xmlns:p="http://schemas.openxmlformats.org/presentationml/2006/main" xmlns:m="http://schemas.openxmlformats.org/officeDocument/2006/math" xmlns:w="http://schemas.openxmlformats.org/wordprocessingml/2006/main" matchingName="" preserve="1" showMasterPhAnim="0" showMasterSp="0" userDrawn="1">
+<p:sldLayout xmlns:a="http://schemas.openxmlformats.org/drawingml/2006/main" xmlns:r="http://schemas.openxmlformats.org/officeDocument/2006/relationships" xmlns:p="http://schemas.openxmlformats.org/presentationml/2006/main" showMasterSp="0" showMasterPhAnim="0" preserve="1" userDrawn="1">
   <p:cSld name="Icons and text">
     <p:bg>
-      <p:bgPr shadeToTitle="0">
+      <p:bgPr>
         <a:solidFill>
           <a:schemeClr val="bg1"/>
         </a:solidFill>
+        <a:effectLst/>
       </p:bgPr>
     </p:bg>
     <p:spTree>
@@ -2088,13 +2123,14 @@
 </file>
 
 <file path=ppt/slideLayouts/slideLayout13.xml><?xml version="1.0" encoding="utf-8"?>
-<p:sldLayout xmlns:a="http://schemas.openxmlformats.org/drawingml/2006/main" xmlns:r="http://schemas.openxmlformats.org/officeDocument/2006/relationships" xmlns:p="http://schemas.openxmlformats.org/presentationml/2006/main" xmlns:m="http://schemas.openxmlformats.org/officeDocument/2006/math" xmlns:w="http://schemas.openxmlformats.org/wordprocessingml/2006/main" matchingName="" preserve="1" showMasterPhAnim="0" showMasterSp="1" userDrawn="1">
+<p:sldLayout xmlns:a="http://schemas.openxmlformats.org/drawingml/2006/main" xmlns:r="http://schemas.openxmlformats.org/officeDocument/2006/relationships" xmlns:p="http://schemas.openxmlformats.org/presentationml/2006/main" showMasterPhAnim="0" preserve="1" userDrawn="1">
   <p:cSld name="End page">
     <p:bg>
-      <p:bgPr shadeToTitle="0">
+      <p:bgPr>
         <a:solidFill>
           <a:schemeClr val="accent1"/>
         </a:solidFill>
+        <a:effectLst/>
       </p:bgPr>
     </p:bg>
     <p:spTree>
@@ -2275,7 +2311,7 @@
 </file>
 
 <file path=ppt/slideLayouts/slideLayout14.xml><?xml version="1.0" encoding="utf-8"?>
-<p:sldLayout xmlns:a="http://schemas.openxmlformats.org/drawingml/2006/main" xmlns:r="http://schemas.openxmlformats.org/officeDocument/2006/relationships" xmlns:p="http://schemas.openxmlformats.org/presentationml/2006/main" xmlns:m="http://schemas.openxmlformats.org/officeDocument/2006/math" xmlns:w="http://schemas.openxmlformats.org/wordprocessingml/2006/main" matchingName="" preserve="0" showMasterPhAnim="0" showMasterSp="1" type="blank" userDrawn="1">
+<p:sldLayout xmlns:a="http://schemas.openxmlformats.org/drawingml/2006/main" xmlns:r="http://schemas.openxmlformats.org/officeDocument/2006/relationships" xmlns:p="http://schemas.openxmlformats.org/presentationml/2006/main" showMasterPhAnim="0" type="blank" userDrawn="1">
   <p:cSld name="Blank Slide">
     <p:spTree>
       <p:nvGrpSpPr>
@@ -2300,13 +2336,14 @@
 </file>
 
 <file path=ppt/slideLayouts/slideLayout2.xml><?xml version="1.0" encoding="utf-8"?>
-<p:sldLayout xmlns:a="http://schemas.openxmlformats.org/drawingml/2006/main" xmlns:r="http://schemas.openxmlformats.org/officeDocument/2006/relationships" xmlns:p="http://schemas.openxmlformats.org/presentationml/2006/main" xmlns:m="http://schemas.openxmlformats.org/officeDocument/2006/math" xmlns:w="http://schemas.openxmlformats.org/wordprocessingml/2006/main" matchingName="" preserve="1" showMasterPhAnim="0" showMasterSp="1" type="title" userDrawn="1">
+<p:sldLayout xmlns:a="http://schemas.openxmlformats.org/drawingml/2006/main" xmlns:r="http://schemas.openxmlformats.org/officeDocument/2006/relationships" xmlns:p="http://schemas.openxmlformats.org/presentationml/2006/main" showMasterPhAnim="0" type="title" preserve="1" userDrawn="1">
   <p:cSld name="Section divider">
     <p:bg>
-      <p:bgPr shadeToTitle="0">
+      <p:bgPr>
         <a:solidFill>
           <a:schemeClr val="accent1"/>
         </a:solidFill>
+        <a:effectLst/>
       </p:bgPr>
     </p:bg>
     <p:spTree>
@@ -2558,13 +2595,14 @@
 </file>
 
 <file path=ppt/slideLayouts/slideLayout3.xml><?xml version="1.0" encoding="utf-8"?>
-<p:sldLayout xmlns:a="http://schemas.openxmlformats.org/drawingml/2006/main" xmlns:r="http://schemas.openxmlformats.org/officeDocument/2006/relationships" xmlns:p="http://schemas.openxmlformats.org/presentationml/2006/main" xmlns:m="http://schemas.openxmlformats.org/officeDocument/2006/math" xmlns:w="http://schemas.openxmlformats.org/wordprocessingml/2006/main" matchingName="" preserve="1" showMasterPhAnim="0" showMasterSp="1" userDrawn="1">
+<p:sldLayout xmlns:a="http://schemas.openxmlformats.org/drawingml/2006/main" xmlns:r="http://schemas.openxmlformats.org/officeDocument/2006/relationships" xmlns:p="http://schemas.openxmlformats.org/presentationml/2006/main" showMasterPhAnim="0" preserve="1" userDrawn="1">
   <p:cSld name="Title page">
     <p:bg>
-      <p:bgPr shadeToTitle="0">
+      <p:bgPr>
         <a:solidFill>
           <a:schemeClr val="bg1"/>
         </a:solidFill>
+        <a:effectLst/>
       </p:bgPr>
     </p:bg>
     <p:spTree>
@@ -2870,13 +2908,14 @@
 </file>
 
 <file path=ppt/slideLayouts/slideLayout4.xml><?xml version="1.0" encoding="utf-8"?>
-<p:sldLayout xmlns:a="http://schemas.openxmlformats.org/drawingml/2006/main" xmlns:r="http://schemas.openxmlformats.org/officeDocument/2006/relationships" xmlns:p="http://schemas.openxmlformats.org/presentationml/2006/main" xmlns:m="http://schemas.openxmlformats.org/officeDocument/2006/math" xmlns:w="http://schemas.openxmlformats.org/wordprocessingml/2006/main" matchingName="" preserve="1" showMasterPhAnim="0" showMasterSp="1" type="twoObj" userDrawn="1">
+<p:sldLayout xmlns:a="http://schemas.openxmlformats.org/drawingml/2006/main" xmlns:r="http://schemas.openxmlformats.org/officeDocument/2006/relationships" xmlns:p="http://schemas.openxmlformats.org/presentationml/2006/main" showMasterPhAnim="0" type="twoObj" preserve="1" userDrawn="1">
   <p:cSld name="Title and Two Content">
     <p:bg>
-      <p:bgPr shadeToTitle="0">
+      <p:bgPr>
         <a:solidFill>
           <a:schemeClr val="bg1"/>
         </a:solidFill>
+        <a:effectLst/>
       </p:bgPr>
     </p:bg>
     <p:spTree>
@@ -3172,13 +3211,14 @@
 </file>
 
 <file path=ppt/slideLayouts/slideLayout5.xml><?xml version="1.0" encoding="utf-8"?>
-<p:sldLayout xmlns:a="http://schemas.openxmlformats.org/drawingml/2006/main" xmlns:r="http://schemas.openxmlformats.org/officeDocument/2006/relationships" xmlns:p="http://schemas.openxmlformats.org/presentationml/2006/main" xmlns:m="http://schemas.openxmlformats.org/officeDocument/2006/math" xmlns:w="http://schemas.openxmlformats.org/wordprocessingml/2006/main" matchingName="" preserve="1" showMasterPhAnim="0" showMasterSp="1" type="obj" userDrawn="1">
+<p:sldLayout xmlns:a="http://schemas.openxmlformats.org/drawingml/2006/main" xmlns:r="http://schemas.openxmlformats.org/officeDocument/2006/relationships" xmlns:p="http://schemas.openxmlformats.org/presentationml/2006/main" showMasterPhAnim="0" type="obj" preserve="1" userDrawn="1">
   <p:cSld name="Title and Content">
     <p:bg>
-      <p:bgPr shadeToTitle="0">
+      <p:bgPr>
         <a:solidFill>
           <a:schemeClr val="bg1"/>
         </a:solidFill>
+        <a:effectLst/>
       </p:bgPr>
     </p:bg>
     <p:spTree>
@@ -3384,13 +3424,14 @@
 </file>
 
 <file path=ppt/slideLayouts/slideLayout6.xml><?xml version="1.0" encoding="utf-8"?>
-<p:sldLayout xmlns:a="http://schemas.openxmlformats.org/drawingml/2006/main" xmlns:r="http://schemas.openxmlformats.org/officeDocument/2006/relationships" xmlns:p="http://schemas.openxmlformats.org/presentationml/2006/main" xmlns:m="http://schemas.openxmlformats.org/officeDocument/2006/math" xmlns:w="http://schemas.openxmlformats.org/wordprocessingml/2006/main" matchingName="" preserve="1" showMasterPhAnim="0" showMasterSp="1" type="obj" userDrawn="1">
+<p:sldLayout xmlns:a="http://schemas.openxmlformats.org/drawingml/2006/main" xmlns:r="http://schemas.openxmlformats.org/officeDocument/2006/relationships" xmlns:p="http://schemas.openxmlformats.org/presentationml/2006/main" showMasterPhAnim="0" type="obj" preserve="1" userDrawn="1">
   <p:cSld name="Title and Content Large">
     <p:bg>
-      <p:bgPr shadeToTitle="0">
+      <p:bgPr>
         <a:solidFill>
           <a:schemeClr val="bg1"/>
         </a:solidFill>
+        <a:effectLst/>
       </p:bgPr>
     </p:bg>
     <p:spTree>
@@ -3575,13 +3616,14 @@
 </file>
 
 <file path=ppt/slideLayouts/slideLayout7.xml><?xml version="1.0" encoding="utf-8"?>
-<p:sldLayout xmlns:a="http://schemas.openxmlformats.org/drawingml/2006/main" xmlns:r="http://schemas.openxmlformats.org/officeDocument/2006/relationships" xmlns:p="http://schemas.openxmlformats.org/presentationml/2006/main" xmlns:m="http://schemas.openxmlformats.org/officeDocument/2006/math" xmlns:w="http://schemas.openxmlformats.org/wordprocessingml/2006/main" matchingName="" preserve="1" showMasterPhAnim="0" showMasterSp="1" userDrawn="1">
+<p:sldLayout xmlns:a="http://schemas.openxmlformats.org/drawingml/2006/main" xmlns:r="http://schemas.openxmlformats.org/officeDocument/2006/relationships" xmlns:p="http://schemas.openxmlformats.org/presentationml/2006/main" showMasterPhAnim="0" preserve="1" userDrawn="1">
   <p:cSld name="Title and Content Large blue">
     <p:bg>
-      <p:bgPr shadeToTitle="0">
+      <p:bgPr>
         <a:solidFill>
           <a:schemeClr val="accent1"/>
         </a:solidFill>
+        <a:effectLst/>
       </p:bgPr>
     </p:bg>
     <p:spTree>
@@ -3749,13 +3791,14 @@
 </file>
 
 <file path=ppt/slideLayouts/slideLayout8.xml><?xml version="1.0" encoding="utf-8"?>
-<p:sldLayout xmlns:a="http://schemas.openxmlformats.org/drawingml/2006/main" xmlns:r="http://schemas.openxmlformats.org/officeDocument/2006/relationships" xmlns:p="http://schemas.openxmlformats.org/presentationml/2006/main" xmlns:m="http://schemas.openxmlformats.org/officeDocument/2006/math" xmlns:w="http://schemas.openxmlformats.org/wordprocessingml/2006/main" matchingName="" preserve="1" showMasterPhAnim="0" showMasterSp="1" userDrawn="1">
+<p:sldLayout xmlns:a="http://schemas.openxmlformats.org/drawingml/2006/main" xmlns:r="http://schemas.openxmlformats.org/officeDocument/2006/relationships" xmlns:p="http://schemas.openxmlformats.org/presentationml/2006/main" showMasterPhAnim="0" preserve="1" userDrawn="1">
   <p:cSld name="Title + Image + Content">
     <p:bg>
-      <p:bgPr shadeToTitle="0">
+      <p:bgPr>
         <a:solidFill>
           <a:schemeClr val="bg1"/>
         </a:solidFill>
+        <a:effectLst/>
       </p:bgPr>
     </p:bg>
     <p:spTree>
@@ -3991,13 +4034,14 @@
 </file>
 
 <file path=ppt/slideLayouts/slideLayout9.xml><?xml version="1.0" encoding="utf-8"?>
-<p:sldLayout xmlns:a="http://schemas.openxmlformats.org/drawingml/2006/main" xmlns:r="http://schemas.openxmlformats.org/officeDocument/2006/relationships" xmlns:p="http://schemas.openxmlformats.org/presentationml/2006/main" xmlns:m="http://schemas.openxmlformats.org/officeDocument/2006/math" xmlns:w="http://schemas.openxmlformats.org/wordprocessingml/2006/main" matchingName="" preserve="1" showMasterPhAnim="0" showMasterSp="1" userDrawn="1">
+<p:sldLayout xmlns:a="http://schemas.openxmlformats.org/drawingml/2006/main" xmlns:r="http://schemas.openxmlformats.org/officeDocument/2006/relationships" xmlns:p="http://schemas.openxmlformats.org/presentationml/2006/main" showMasterPhAnim="0" preserve="1" userDrawn="1">
   <p:cSld name="Title + Content + 2 Images">
     <p:bg>
-      <p:bgPr shadeToTitle="0">
+      <p:bgPr>
         <a:solidFill>
           <a:schemeClr val="bg1"/>
         </a:solidFill>
+        <a:effectLst/>
       </p:bgPr>
     </p:bg>
     <p:spTree>
@@ -4320,8 +4364,8 @@
 </file>
 
 <file path=ppt/slideMasters/slideMaster1.xml><?xml version="1.0" encoding="utf-8"?>
-<p:sldMaster xmlns:a="http://schemas.openxmlformats.org/drawingml/2006/main" xmlns:r="http://schemas.openxmlformats.org/officeDocument/2006/relationships" xmlns:p="http://schemas.openxmlformats.org/presentationml/2006/main" xmlns:m="http://schemas.openxmlformats.org/officeDocument/2006/math" xmlns:w="http://schemas.openxmlformats.org/wordprocessingml/2006/main" preserve="0">
-  <p:cSld name="">
+<p:sldMaster xmlns:a="http://schemas.openxmlformats.org/drawingml/2006/main" xmlns:r="http://schemas.openxmlformats.org/officeDocument/2006/relationships" xmlns:p="http://schemas.openxmlformats.org/presentationml/2006/main">
+  <p:cSld>
     <p:bg>
       <p:bgRef idx="1001">
         <a:schemeClr val="bg1"/>
@@ -4564,7 +4608,7 @@
     <p:sldLayoutId id="2147483661" r:id="rId13"/>
     <p:sldLayoutId id="2147483662" r:id="rId14"/>
   </p:sldLayoutIdLst>
-  <p:hf dt="0" ftr="1" hdr="0" sldNum="1"/>
+  <p:hf hdr="0" dt="0"/>
   <p:txStyles>
     <p:titleStyle>
       <a:lvl1pPr algn="l" defTabSz="914400" rtl="0">
@@ -4858,16 +4902,17 @@
 </file>
 
 <file path=ppt/slides/slide1.xml><?xml version="1.0" encoding="utf-8"?>
-<p:sld xmlns:a="http://schemas.openxmlformats.org/drawingml/2006/main" xmlns:r="http://schemas.openxmlformats.org/officeDocument/2006/relationships" xmlns:p="http://schemas.openxmlformats.org/presentationml/2006/main" xmlns:m="http://schemas.openxmlformats.org/officeDocument/2006/math" xmlns:w="http://schemas.openxmlformats.org/wordprocessingml/2006/main" xmlns:mc="http://schemas.openxmlformats.org/markup-compatibility/2006" showMasterPhAnim="0" showMasterSp="1" show="1">
-  <p:cSld name="">
+<p:sld xmlns:a="http://schemas.openxmlformats.org/drawingml/2006/main" xmlns:r="http://schemas.openxmlformats.org/officeDocument/2006/relationships" xmlns:p="http://schemas.openxmlformats.org/presentationml/2006/main" showMasterPhAnim="0">
+  <p:cSld>
     <p:bg>
-      <p:bgPr shadeToTitle="0">
+      <p:bgPr>
         <a:blipFill>
           <a:blip r:embed="rId3">
             <a:lum/>
           </a:blip>
           <a:stretch/>
         </a:blipFill>
+        <a:effectLst/>
       </p:bgPr>
     </p:bg>
     <p:spTree>
@@ -4994,7 +5039,6 @@
               <a:rPr lang="en-GB"/>
               <a:t>7COM1079-2025  Student Group No:A5                    Names of Student Attendees  (all group should attend to get feedback): </a:t>
             </a:r>
-            <a:endParaRPr lang="en-GB"/>
           </a:p>
           <a:p>
             <a:pPr>
@@ -5028,62 +5072,7 @@
                 <a:ea typeface="Arial"/>
                 <a:cs typeface="Arial"/>
               </a:rPr>
-              <a:t>Isaac Kechem, </a:t>
-            </a:r>
-            <a:r>
-              <a:rPr lang="en-GB" sz="1500" b="0" i="0" u="none" strike="noStrike" cap="none" spc="0">
-                <a:solidFill>
-                  <a:schemeClr val="bg1"/>
-                </a:solidFill>
-                <a:latin typeface="Arial"/>
-                <a:ea typeface="Arial"/>
-                <a:cs typeface="Arial"/>
-              </a:rPr>
-              <a:t>James Boro Kabecha</a:t>
-            </a:r>
-            <a:r>
-              <a:rPr lang="en-GB" sz="1500" b="0" i="0" u="none" strike="noStrike" cap="none" spc="0">
-                <a:solidFill>
-                  <a:schemeClr val="bg1"/>
-                </a:solidFill>
-                <a:latin typeface="Arial"/>
-                <a:ea typeface="Arial"/>
-                <a:cs typeface="Arial"/>
-              </a:rPr>
-              <a:t>, </a:t>
-            </a:r>
-            <a:r>
-              <a:rPr lang="en-GB" sz="1500" b="0" i="0" u="none" strike="noStrike" cap="none" spc="0">
-                <a:solidFill>
-                  <a:schemeClr val="bg1"/>
-                </a:solidFill>
-                <a:latin typeface="Arial"/>
-                <a:ea typeface="Arial"/>
-                <a:cs typeface="Arial"/>
-              </a:rPr>
-              <a:t>John Gathogo</a:t>
-            </a:r>
-            <a:r>
-              <a:rPr lang="en-GB" sz="1500" b="0" i="0" u="none" strike="noStrike" cap="none" spc="0">
-                <a:solidFill>
-                  <a:schemeClr val="bg1"/>
-                </a:solidFill>
-                <a:latin typeface="Arial"/>
-                <a:ea typeface="Arial"/>
-                <a:cs typeface="Arial"/>
-              </a:rPr>
-              <a:t>, </a:t>
-            </a:r>
-            <a:r>
-              <a:rPr lang="en-GB" sz="1500" b="0" i="0" u="none" strike="noStrike" cap="none" spc="0">
-                <a:solidFill>
-                  <a:schemeClr val="bg1"/>
-                </a:solidFill>
-                <a:latin typeface="Arial"/>
-                <a:ea typeface="Arial"/>
-                <a:cs typeface="Arial"/>
-              </a:rPr>
-              <a:t>					Moses Musoga</a:t>
+              <a:t>Isaac Kechem, James Boro Kabecha, John Gathogo, 					Moses Musoga</a:t>
             </a:r>
             <a:endParaRPr lang="en-GB" sz="1500" b="0" i="0" u="none" strike="noStrike" cap="none" spc="0">
               <a:solidFill>
@@ -5115,7 +5104,7 @@
             </a:pPr>
             <a:fld id="{E4D355CA-84B7-41B1-B164-8BB439CC7C6B}" type="slidenum">
               <a:rPr lang="en-GB"/>
-              <a:t>3</a:t>
+              <a:t>1</a:t>
             </a:fld>
             <a:endParaRPr lang="en-GB"/>
           </a:p>
@@ -5126,20 +5115,12 @@
   <p:clrMapOvr>
     <a:masterClrMapping/>
   </p:clrMapOvr>
-  <mc:AlternateContent xmlns:mc="http://schemas.openxmlformats.org/markup-compatibility/2006">
-    <mc:Choice xmlns:p159="http://schemas.microsoft.com/office/powerpoint/2015/09/main" xmlns:p14="http://schemas.microsoft.com/office/powerpoint/2010/main" Requires="p159">
-      <p:transition p14:dur="2000" advClick="1"/>
-    </mc:Choice>
-    <mc:Fallback>
-      <p:transition advClick="1"/>
-    </mc:Fallback>
-  </mc:AlternateContent>
 </p:sld>
 </file>
 
 <file path=ppt/slides/slide10.xml><?xml version="1.0" encoding="utf-8"?>
-<p:sld xmlns:a="http://schemas.openxmlformats.org/drawingml/2006/main" xmlns:r="http://schemas.openxmlformats.org/officeDocument/2006/relationships" xmlns:p="http://schemas.openxmlformats.org/presentationml/2006/main" xmlns:m="http://schemas.openxmlformats.org/officeDocument/2006/math" xmlns:w="http://schemas.openxmlformats.org/wordprocessingml/2006/main" xmlns:mc="http://schemas.openxmlformats.org/markup-compatibility/2006" showMasterPhAnim="0" showMasterSp="1" show="1">
-  <p:cSld name="">
+<p:sld xmlns:a="http://schemas.openxmlformats.org/drawingml/2006/main" xmlns:r="http://schemas.openxmlformats.org/officeDocument/2006/relationships" xmlns:p="http://schemas.openxmlformats.org/presentationml/2006/main" showMasterPhAnim="0">
+  <p:cSld>
     <p:spTree>
       <p:nvGrpSpPr>
         <p:cNvPr id="1" name=""/>
@@ -5238,7 +5219,7 @@
                 </a:solidFill>
                 <a:latin typeface="Arial"/>
               </a:rPr>
-              <a:t>13</a:t>
+              <a:t>10</a:t>
             </a:fld>
             <a:endParaRPr lang="en-US" sz="1500" b="0" strike="noStrike" spc="-1">
               <a:latin typeface="Times New Roman"/>
@@ -5416,12 +5397,6 @@
               </a:rPr>
               <a:t> </a:t>
             </a:r>
-            <a:endParaRPr lang="en-GB" sz="3600" b="0" strike="noStrike" spc="-200">
-              <a:solidFill>
-                <a:srgbClr val="203232"/>
-              </a:solidFill>
-              <a:latin typeface="Arial"/>
-            </a:endParaRPr>
           </a:p>
           <a:p>
             <a:pPr marL="285750" indent="-285750">
@@ -5479,50 +5454,17 @@
                 </a:solidFill>
                 <a:latin typeface="Arial"/>
               </a:rPr>
-              <a:t>fail to reject the </a:t>
-            </a:r>
-            <a:r>
-              <a:rPr lang="en-US" sz="3600" spc="-201">
+              <a:t>fail to reject the null hypothesis’</a:t>
+            </a:r>
+            <a:r>
+              <a:rPr lang="en-US" sz="3600" b="0" strike="noStrike" spc="-201">
                 <a:solidFill>
                   <a:srgbClr val="203232"/>
                 </a:solidFill>
                 <a:latin typeface="Arial"/>
               </a:rPr>
-              <a:t>null hypothesis’</a:t>
-            </a:r>
-            <a:r>
-              <a:rPr lang="en-US" sz="3600" b="0" strike="noStrike" spc="-201">
-                <a:solidFill>
-                  <a:srgbClr val="203232"/>
-                </a:solidFill>
-                <a:latin typeface="Arial"/>
-              </a:rPr>
-              <a:t> or ‘reject </a:t>
-            </a:r>
-            <a:r>
-              <a:rPr lang="en-US" sz="3600" b="0" strike="noStrike" spc="-201">
-                <a:solidFill>
-                  <a:srgbClr val="203232"/>
-                </a:solidFill>
-                <a:latin typeface="Arial"/>
-              </a:rPr>
-              <a:t>the </a:t>
-            </a:r>
-            <a:r>
-              <a:rPr lang="en-US" sz="3600" b="0" strike="noStrike" spc="-201">
-                <a:solidFill>
-                  <a:srgbClr val="203232"/>
-                </a:solidFill>
-                <a:latin typeface="Arial"/>
-              </a:rPr>
-              <a:t>null hypothesis’?</a:t>
-            </a:r>
-            <a:endParaRPr lang="en-US" sz="3600" b="0" strike="noStrike" spc="-201">
-              <a:solidFill>
-                <a:srgbClr val="203232"/>
-              </a:solidFill>
-              <a:latin typeface="Arial"/>
-            </a:endParaRPr>
+              <a:t> or ‘reject the null hypothesis’?</a:t>
+            </a:r>
           </a:p>
           <a:p>
             <a:pPr marL="285750" indent="-285750">
@@ -5548,20 +5490,12 @@
   <p:clrMapOvr>
     <a:masterClrMapping/>
   </p:clrMapOvr>
-  <mc:AlternateContent xmlns:mc="http://schemas.openxmlformats.org/markup-compatibility/2006">
-    <mc:Choice xmlns:p159="http://schemas.microsoft.com/office/powerpoint/2015/09/main" xmlns:p14="http://schemas.microsoft.com/office/powerpoint/2010/main" Requires="p159">
-      <p:transition p14:dur="2000" advClick="1"/>
-    </mc:Choice>
-    <mc:Fallback>
-      <p:transition advClick="1"/>
-    </mc:Fallback>
-  </mc:AlternateContent>
 </p:sld>
 </file>
 
 <file path=ppt/slides/slide2.xml><?xml version="1.0" encoding="utf-8"?>
-<p:sld xmlns:a="http://schemas.openxmlformats.org/drawingml/2006/main" xmlns:r="http://schemas.openxmlformats.org/officeDocument/2006/relationships" xmlns:p="http://schemas.openxmlformats.org/presentationml/2006/main" xmlns:m="http://schemas.openxmlformats.org/officeDocument/2006/math" xmlns:w="http://schemas.openxmlformats.org/wordprocessingml/2006/main" xmlns:mc="http://schemas.openxmlformats.org/markup-compatibility/2006" showMasterPhAnim="0" showMasterSp="1" show="1">
-  <p:cSld name="">
+<p:sld xmlns:a="http://schemas.openxmlformats.org/drawingml/2006/main" xmlns:r="http://schemas.openxmlformats.org/officeDocument/2006/relationships" xmlns:p="http://schemas.openxmlformats.org/presentationml/2006/main" showMasterPhAnim="0">
+  <p:cSld>
     <p:spTree>
       <p:nvGrpSpPr>
         <p:cNvPr id="1" name=""/>
@@ -5653,7 +5587,7 @@
             </a:pPr>
             <a:fld id="{E4D355CA-84B7-41B1-B164-8BB439CC7C6B}" type="slidenum">
               <a:rPr lang="en-GB"/>
-              <a:t>4</a:t>
+              <a:t>2</a:t>
             </a:fld>
             <a:endParaRPr lang="en-GB"/>
           </a:p>
@@ -5693,23 +5627,7 @@
                   <a:srgbClr val="FF0000"/>
                 </a:solidFill>
               </a:rPr>
-              <a:t>If you have not defined your Research Question (RQ) yet, please do not attempt to present Visualizations and/or analyses of your data.  Go to Canvas, announcements on RQ presentations, and use the PowerPoint template provided for you to present your RQ.  You can use the time slot to present your RQ instead of the </a:t>
-            </a:r>
-            <a:r>
-              <a:rPr lang="en-US" sz="3000">
-                <a:solidFill>
-                  <a:srgbClr val="FF0000"/>
-                </a:solidFill>
-              </a:rPr>
-              <a:t>Visualisation</a:t>
-            </a:r>
-            <a:r>
-              <a:rPr lang="en-US" sz="3000">
-                <a:solidFill>
-                  <a:srgbClr val="FF0000"/>
-                </a:solidFill>
-              </a:rPr>
-              <a:t>.</a:t>
+              <a:t>If you have not defined your Research Question (RQ) yet, please do not attempt to present Visualizations and/or analyses of your data.  Go to Canvas, announcements on RQ presentations, and use the PowerPoint template provided for you to present your RQ.  You can use the time slot to present your RQ instead of the Visualisation.</a:t>
             </a:r>
             <a:endParaRPr lang="en-GB" sz="3000">
               <a:solidFill>
@@ -5724,20 +5642,12 @@
   <p:clrMapOvr>
     <a:masterClrMapping/>
   </p:clrMapOvr>
-  <mc:AlternateContent xmlns:mc="http://schemas.openxmlformats.org/markup-compatibility/2006">
-    <mc:Choice xmlns:p159="http://schemas.microsoft.com/office/powerpoint/2015/09/main" xmlns:p14="http://schemas.microsoft.com/office/powerpoint/2010/main" Requires="p159">
-      <p:transition p14:dur="2000" advClick="1"/>
-    </mc:Choice>
-    <mc:Fallback>
-      <p:transition advClick="1"/>
-    </mc:Fallback>
-  </mc:AlternateContent>
 </p:sld>
 </file>
 
 <file path=ppt/slides/slide3.xml><?xml version="1.0" encoding="utf-8"?>
-<p:sld xmlns:a="http://schemas.openxmlformats.org/drawingml/2006/main" xmlns:r="http://schemas.openxmlformats.org/officeDocument/2006/relationships" xmlns:p="http://schemas.openxmlformats.org/presentationml/2006/main" xmlns:m="http://schemas.openxmlformats.org/officeDocument/2006/math" xmlns:w="http://schemas.openxmlformats.org/wordprocessingml/2006/main" xmlns:mc="http://schemas.openxmlformats.org/markup-compatibility/2006" showMasterPhAnim="0" showMasterSp="1" show="1">
-  <p:cSld name="">
+<p:sld xmlns:a="http://schemas.openxmlformats.org/drawingml/2006/main" xmlns:r="http://schemas.openxmlformats.org/officeDocument/2006/relationships" xmlns:p="http://schemas.openxmlformats.org/presentationml/2006/main" showMasterPhAnim="0">
+  <p:cSld>
     <p:spTree>
       <p:nvGrpSpPr>
         <p:cNvPr id="1" name=""/>
@@ -5776,14 +5686,14 @@
               <a:defRPr/>
             </a:pPr>
             <a:r>
-              <a:rPr lang="en-US" sz="2400" b="0">
+              <a:rPr lang="en-US" sz="2400" b="0" dirty="0">
                 <a:latin typeface="Calibri"/>
                 <a:cs typeface="Calibri"/>
               </a:rPr>
               <a:t>We are using the dataset</a:t>
             </a:r>
             <a:r>
-              <a:rPr lang="en-US" sz="2400" b="0">
+              <a:rPr lang="en-US" sz="2400" b="0" dirty="0">
                 <a:solidFill>
                   <a:srgbClr val="FF0000"/>
                 </a:solidFill>
@@ -5793,7 +5703,7 @@
               <a:t>   </a:t>
             </a:r>
             <a:r>
-              <a:rPr lang="en-US" sz="2400" b="0" i="0" u="none" strike="noStrike" cap="none" spc="-99">
+              <a:rPr lang="en-US" sz="2400" b="0" i="0" u="none" strike="noStrike" cap="none" spc="-99" dirty="0">
                 <a:solidFill>
                   <a:srgbClr val="FF0000"/>
                 </a:solidFill>
@@ -5804,7 +5714,7 @@
               <a:t>ds256</a:t>
             </a:r>
             <a:r>
-              <a:rPr lang="en-GB" sz="2400" b="0">
+              <a:rPr lang="en-GB" sz="2400" b="0" dirty="0">
                 <a:solidFill>
                   <a:srgbClr val="FF0000"/>
                 </a:solidFill>
@@ -5814,7 +5724,7 @@
               <a:t> loan_data.csv </a:t>
             </a:r>
             <a:r>
-              <a:rPr lang="en-GB" sz="2400" b="0">
+              <a:rPr lang="en-GB" sz="2400" b="0" dirty="0">
                 <a:solidFill>
                   <a:schemeClr val="tx1"/>
                 </a:solidFill>
@@ -5824,7 +5734,7 @@
               <a:t>to </a:t>
             </a:r>
             <a:r>
-              <a:rPr lang="en-US" sz="2400" b="0">
+              <a:rPr lang="en-US" sz="2400" b="0" dirty="0">
                 <a:solidFill>
                   <a:schemeClr val="tx1"/>
                 </a:solidFill>
@@ -5833,20 +5743,13 @@
               </a:rPr>
               <a:t>answer our Research Question </a:t>
             </a:r>
-            <a:endParaRPr lang="en-US" sz="2400" b="0">
-              <a:solidFill>
-                <a:schemeClr val="tx1"/>
-              </a:solidFill>
-              <a:latin typeface="Calibri"/>
-              <a:cs typeface="Calibri"/>
-            </a:endParaRPr>
-          </a:p>
-          <a:p>
-            <a:pPr>
-              <a:defRPr/>
-            </a:pPr>
-            <a:r>
-              <a:rPr lang="en-US" sz="2400" b="0">
+          </a:p>
+          <a:p>
+            <a:pPr>
+              <a:defRPr/>
+            </a:pPr>
+            <a:r>
+              <a:rPr lang="en-US" sz="2400" b="0" dirty="0">
                 <a:solidFill>
                   <a:schemeClr val="tx1"/>
                 </a:solidFill>
@@ -5856,7 +5759,7 @@
               <a:t> </a:t>
             </a:r>
             <a:r>
-              <a:rPr lang="en-US" sz="2400" b="0">
+              <a:rPr lang="en-US" sz="2400" b="0" dirty="0">
                 <a:solidFill>
                   <a:srgbClr val="FF0000"/>
                 </a:solidFill>
@@ -5866,7 +5769,7 @@
               <a:t>“ </a:t>
             </a:r>
             <a:r>
-              <a:rPr lang="en-US" sz="2400" b="0" i="0" u="none" strike="noStrike" cap="none" spc="-99">
+              <a:rPr lang="en-US" sz="2400" b="0" i="0" u="none" strike="noStrike" cap="none" spc="-99" dirty="0">
                 <a:solidFill>
                   <a:srgbClr val="FF0000"/>
                 </a:solidFill>
@@ -5877,7 +5780,7 @@
               <a:t>Is there a correlation between loan amount and personal income for applicants?</a:t>
             </a:r>
             <a:r>
-              <a:rPr lang="en-US" sz="2400" b="0">
+              <a:rPr lang="en-US" sz="2400" b="0" dirty="0">
                 <a:solidFill>
                   <a:srgbClr val="FF0000"/>
                 </a:solidFill>
@@ -5887,7 +5790,7 @@
               <a:t>”</a:t>
             </a:r>
             <a:r>
-              <a:rPr lang="en-US" sz="2400" b="0">
+              <a:rPr lang="en-US" sz="2400" b="0" dirty="0">
                 <a:solidFill>
                   <a:schemeClr val="tx1"/>
                 </a:solidFill>
@@ -5897,7 +5800,7 @@
               <a:t> </a:t>
             </a:r>
             <a:r>
-              <a:rPr lang="en-US" sz="2400" baseline="30000">
+              <a:rPr lang="en-US" sz="2400" baseline="30000" dirty="0">
                 <a:solidFill>
                   <a:schemeClr val="tx1"/>
                 </a:solidFill>
@@ -5906,14 +5809,14 @@
               </a:rPr>
               <a:t>1</a:t>
             </a:r>
-            <a:endParaRPr/>
+            <a:endParaRPr dirty="0"/>
           </a:p>
           <a:p>
             <a:pPr>
               <a:defRPr/>
             </a:pPr>
             <a:br>
-              <a:rPr lang="en-US" sz="2400" b="0">
+              <a:rPr lang="en-US" sz="2400" b="0" dirty="0">
                 <a:solidFill>
                   <a:srgbClr val="FF0000"/>
                 </a:solidFill>
@@ -5921,7 +5824,7 @@
                 <a:cs typeface="Calibri"/>
               </a:rPr>
             </a:br>
-            <a:endParaRPr lang="en-US" sz="2400">
+            <a:endParaRPr lang="en-US" sz="2400" dirty="0">
               <a:solidFill>
                 <a:schemeClr val="tx1"/>
               </a:solidFill>
@@ -5951,7 +5854,7 @@
             </a:pPr>
             <a:fld id="{E4D355CA-84B7-41B1-B164-8BB439CC7C6B}" type="slidenum">
               <a:rPr lang="en-GB"/>
-              <a:t>5</a:t>
+              <a:t>3</a:t>
             </a:fld>
             <a:endParaRPr lang="en-GB"/>
           </a:p>
@@ -5964,7 +5867,7 @@
           <p:nvPr/>
         </p:nvSpPr>
         <p:spPr bwMode="auto">
-          <a:xfrm flipH="0" flipV="0">
+          <a:xfrm>
             <a:off x="872974" y="1854019"/>
             <a:ext cx="9979839" cy="823320"/>
           </a:xfrm>
@@ -5983,7 +5886,7 @@
               <a:defRPr/>
             </a:pPr>
             <a:r>
-              <a:rPr lang="en-GB" sz="2400">
+              <a:rPr lang="en-GB" sz="2400" dirty="0">
                 <a:solidFill>
                   <a:srgbClr val="FF0000"/>
                 </a:solidFill>
@@ -5999,7 +5902,18 @@
                 <a:ea typeface="Arial"/>
                 <a:cs typeface="Arial"/>
               </a:rPr>
-              <a:t>loan_intent</a:t>
+              <a:t>loan_</a:t>
+            </a:r>
+            <a:r>
+              <a:rPr lang="en-GB" sz="2400" b="1">
+                <a:solidFill>
+                  <a:srgbClr val="FF0000"/>
+                </a:solidFill>
+                <a:latin typeface="Arial"/>
+                <a:ea typeface="Arial"/>
+                <a:cs typeface="Arial"/>
+              </a:rPr>
+              <a:t>amount</a:t>
             </a:r>
             <a:r>
               <a:rPr lang="en-GB" sz="2400" b="1">
@@ -6034,7 +5948,7 @@
               <a:t>) and </a:t>
             </a:r>
             <a:r>
-              <a:rPr lang="en-GB" sz="2400" b="1" i="0" u="none" strike="noStrike" cap="none" spc="0">
+              <a:rPr lang="en-GB" sz="2400" b="1" i="0" u="none" strike="noStrike" cap="none" spc="0" dirty="0" err="1">
                 <a:solidFill>
                   <a:srgbClr val="FF0000"/>
                 </a:solidFill>
@@ -6045,7 +5959,7 @@
               <a:t>person_income</a:t>
             </a:r>
             <a:r>
-              <a:rPr lang="en-GB" sz="2400">
+              <a:rPr lang="en-GB" sz="2400" dirty="0">
                 <a:solidFill>
                   <a:srgbClr val="FF0000"/>
                 </a:solidFill>
@@ -6053,7 +5967,7 @@
               <a:t> (independent variable</a:t>
             </a:r>
             <a:r>
-              <a:rPr lang="en-GB" sz="2400" baseline="30000">
+              <a:rPr lang="en-GB" sz="2400" baseline="30000" dirty="0">
                 <a:solidFill>
                   <a:srgbClr val="FF0000"/>
                 </a:solidFill>
@@ -6061,14 +5975,14 @@
               <a:t>4</a:t>
             </a:r>
             <a:r>
-              <a:rPr lang="en-GB" sz="2400">
+              <a:rPr lang="en-GB" sz="2400" dirty="0">
                 <a:solidFill>
                   <a:srgbClr val="FF0000"/>
                 </a:solidFill>
               </a:rPr>
               <a:t>).</a:t>
             </a:r>
-            <a:endParaRPr/>
+            <a:endParaRPr dirty="0"/>
           </a:p>
         </p:txBody>
       </p:sp>
@@ -6133,7 +6047,7 @@
       </p:cxnSp>
       <p:pic>
         <p:nvPicPr>
-          <p:cNvPr id="1690413670" name=""/>
+          <p:cNvPr id="1690413670" name="Picture 1690413669"/>
           <p:cNvPicPr>
             <a:picLocks noChangeAspect="1"/>
           </p:cNvPicPr>
@@ -6158,20 +6072,12 @@
   <p:clrMapOvr>
     <a:masterClrMapping/>
   </p:clrMapOvr>
-  <mc:AlternateContent xmlns:mc="http://schemas.openxmlformats.org/markup-compatibility/2006">
-    <mc:Choice xmlns:p159="http://schemas.microsoft.com/office/powerpoint/2015/09/main" xmlns:p14="http://schemas.microsoft.com/office/powerpoint/2010/main" Requires="p159">
-      <p:transition p14:dur="2000" advClick="1"/>
-    </mc:Choice>
-    <mc:Fallback>
-      <p:transition advClick="1"/>
-    </mc:Fallback>
-  </mc:AlternateContent>
 </p:sld>
 </file>
 
 <file path=ppt/slides/slide4.xml><?xml version="1.0" encoding="utf-8"?>
-<p:sld xmlns:a="http://schemas.openxmlformats.org/drawingml/2006/main" xmlns:r="http://schemas.openxmlformats.org/officeDocument/2006/relationships" xmlns:p="http://schemas.openxmlformats.org/presentationml/2006/main" xmlns:m="http://schemas.openxmlformats.org/officeDocument/2006/math" xmlns:w="http://schemas.openxmlformats.org/wordprocessingml/2006/main" xmlns:mc="http://schemas.openxmlformats.org/markup-compatibility/2006" showMasterPhAnim="0" showMasterSp="1" show="1">
-  <p:cSld name="">
+<p:sld xmlns:a="http://schemas.openxmlformats.org/drawingml/2006/main" xmlns:r="http://schemas.openxmlformats.org/officeDocument/2006/relationships" xmlns:p="http://schemas.openxmlformats.org/presentationml/2006/main" showMasterPhAnim="0">
+  <p:cSld>
     <p:spTree>
       <p:nvGrpSpPr>
         <p:cNvPr id="1" name=""/>
@@ -6219,7 +6125,7 @@
             </a:pPr>
             <a:fld id="{1B678747-91CA-5540-8200-ED98C1E477D9}" type="slidenum">
               <a:rPr lang="en-GB"/>
-              <a:t/>
+              <a:t>4</a:t>
             </a:fld>
             <a:endParaRPr lang="en-GB"/>
           </a:p>
@@ -6227,7 +6133,7 @@
       </p:sp>
       <p:pic>
         <p:nvPicPr>
-          <p:cNvPr id="1067777518" name=""/>
+          <p:cNvPr id="1067777518" name="Picture 1067777517"/>
           <p:cNvPicPr>
             <a:picLocks noChangeAspect="1"/>
           </p:cNvPicPr>
@@ -6238,7 +6144,7 @@
           <a:stretch/>
         </p:blipFill>
         <p:spPr bwMode="auto">
-          <a:xfrm flipH="0" flipV="0">
+          <a:xfrm>
             <a:off x="2086520" y="129075"/>
             <a:ext cx="8025037" cy="5317679"/>
           </a:xfrm>
@@ -6252,20 +6158,12 @@
   <p:clrMapOvr>
     <a:masterClrMapping/>
   </p:clrMapOvr>
-  <mc:AlternateContent xmlns:mc="http://schemas.openxmlformats.org/markup-compatibility/2006">
-    <mc:Choice xmlns:p159="http://schemas.microsoft.com/office/powerpoint/2015/09/main" xmlns:p14="http://schemas.microsoft.com/office/powerpoint/2010/main" Requires="p159">
-      <p:transition p14:dur="2000" advClick="1"/>
-    </mc:Choice>
-    <mc:Fallback>
-      <p:transition advClick="1"/>
-    </mc:Fallback>
-  </mc:AlternateContent>
 </p:sld>
 </file>
 
 <file path=ppt/slides/slide5.xml><?xml version="1.0" encoding="utf-8"?>
-<p:sld xmlns:a="http://schemas.openxmlformats.org/drawingml/2006/main" xmlns:r="http://schemas.openxmlformats.org/officeDocument/2006/relationships" xmlns:p="http://schemas.openxmlformats.org/presentationml/2006/main" xmlns:m="http://schemas.openxmlformats.org/officeDocument/2006/math" xmlns:w="http://schemas.openxmlformats.org/wordprocessingml/2006/main" xmlns:mc="http://schemas.openxmlformats.org/markup-compatibility/2006" showMasterPhAnim="0" showMasterSp="1" show="1">
-  <p:cSld name="">
+<p:sld xmlns:a="http://schemas.openxmlformats.org/drawingml/2006/main" xmlns:r="http://schemas.openxmlformats.org/officeDocument/2006/relationships" xmlns:p="http://schemas.openxmlformats.org/presentationml/2006/main" showMasterPhAnim="0">
+  <p:cSld>
     <p:spTree>
       <p:nvGrpSpPr>
         <p:cNvPr id="1" name=""/>
@@ -6313,7 +6211,7 @@
             </a:pPr>
             <a:fld id="{742A4E25-18C6-5EE1-9FA6-E574CCDCAF25}" type="slidenum">
               <a:rPr lang="en-GB"/>
-              <a:t/>
+              <a:t>5</a:t>
             </a:fld>
             <a:endParaRPr lang="en-GB"/>
           </a:p>
@@ -6321,7 +6219,7 @@
       </p:sp>
       <p:pic>
         <p:nvPicPr>
-          <p:cNvPr id="1605372903" name=""/>
+          <p:cNvPr id="1605372903" name="Picture 1605372902"/>
           <p:cNvPicPr>
             <a:picLocks noChangeAspect="1"/>
           </p:cNvPicPr>
@@ -6332,7 +6230,7 @@
           <a:stretch/>
         </p:blipFill>
         <p:spPr bwMode="auto">
-          <a:xfrm flipH="0" flipV="0">
+          <a:xfrm>
             <a:off x="2185558" y="111210"/>
             <a:ext cx="7990616" cy="5294869"/>
           </a:xfrm>
@@ -6346,20 +6244,12 @@
   <p:clrMapOvr>
     <a:masterClrMapping/>
   </p:clrMapOvr>
-  <mc:AlternateContent xmlns:mc="http://schemas.openxmlformats.org/markup-compatibility/2006">
-    <mc:Choice xmlns:p159="http://schemas.microsoft.com/office/powerpoint/2015/09/main" xmlns:p14="http://schemas.microsoft.com/office/powerpoint/2010/main" Requires="p159">
-      <p:transition p14:dur="2000" advClick="1"/>
-    </mc:Choice>
-    <mc:Fallback>
-      <p:transition advClick="1"/>
-    </mc:Fallback>
-  </mc:AlternateContent>
 </p:sld>
 </file>
 
 <file path=ppt/slides/slide6.xml><?xml version="1.0" encoding="utf-8"?>
-<p:sld xmlns:a="http://schemas.openxmlformats.org/drawingml/2006/main" xmlns:r="http://schemas.openxmlformats.org/officeDocument/2006/relationships" xmlns:p="http://schemas.openxmlformats.org/presentationml/2006/main" xmlns:m="http://schemas.openxmlformats.org/officeDocument/2006/math" xmlns:w="http://schemas.openxmlformats.org/wordprocessingml/2006/main" xmlns:mc="http://schemas.openxmlformats.org/markup-compatibility/2006" showMasterPhAnim="0" showMasterSp="1" show="1">
-  <p:cSld name="">
+<p:sld xmlns:a="http://schemas.openxmlformats.org/drawingml/2006/main" xmlns:r="http://schemas.openxmlformats.org/officeDocument/2006/relationships" xmlns:p="http://schemas.openxmlformats.org/presentationml/2006/main" showMasterPhAnim="0">
+  <p:cSld>
     <p:spTree>
       <p:nvGrpSpPr>
         <p:cNvPr id="1" name=""/>
@@ -6451,7 +6341,7 @@
             </a:pPr>
             <a:fld id="{E4D355CA-84B7-41B1-B164-8BB439CC7C6B}" type="slidenum">
               <a:rPr lang="en-GB"/>
-              <a:t>9</a:t>
+              <a:t>6</a:t>
             </a:fld>
             <a:endParaRPr lang="en-GB"/>
           </a:p>
@@ -6501,20 +6391,12 @@
   <p:clrMapOvr>
     <a:masterClrMapping/>
   </p:clrMapOvr>
-  <mc:AlternateContent xmlns:mc="http://schemas.openxmlformats.org/markup-compatibility/2006">
-    <mc:Choice xmlns:p159="http://schemas.microsoft.com/office/powerpoint/2015/09/main" xmlns:p14="http://schemas.microsoft.com/office/powerpoint/2010/main" Requires="p159">
-      <p:transition p14:dur="2000" advClick="1"/>
-    </mc:Choice>
-    <mc:Fallback>
-      <p:transition advClick="1"/>
-    </mc:Fallback>
-  </mc:AlternateContent>
 </p:sld>
 </file>
 
 <file path=ppt/slides/slide7.xml><?xml version="1.0" encoding="utf-8"?>
-<p:sld xmlns:a="http://schemas.openxmlformats.org/drawingml/2006/main" xmlns:r="http://schemas.openxmlformats.org/officeDocument/2006/relationships" xmlns:p="http://schemas.openxmlformats.org/presentationml/2006/main" xmlns:m="http://schemas.openxmlformats.org/officeDocument/2006/math" xmlns:w="http://schemas.openxmlformats.org/wordprocessingml/2006/main" xmlns:mc="http://schemas.openxmlformats.org/markup-compatibility/2006" showMasterPhAnim="0" showMasterSp="1" show="1">
-  <p:cSld name="">
+<p:sld xmlns:a="http://schemas.openxmlformats.org/drawingml/2006/main" xmlns:r="http://schemas.openxmlformats.org/officeDocument/2006/relationships" xmlns:p="http://schemas.openxmlformats.org/presentationml/2006/main" showMasterPhAnim="0">
+  <p:cSld>
     <p:spTree>
       <p:nvGrpSpPr>
         <p:cNvPr id="1" name=""/>
@@ -6895,7 +6777,7 @@
                 </a:solidFill>
                 <a:latin typeface="Arial"/>
               </a:rPr>
-              <a:t>10</a:t>
+              <a:t>7</a:t>
             </a:fld>
             <a:endParaRPr lang="en-US" sz="1100" b="0" strike="noStrike" spc="-1">
               <a:latin typeface="Times New Roman"/>
@@ -7449,20 +7331,12 @@
   <p:clrMapOvr>
     <a:masterClrMapping/>
   </p:clrMapOvr>
-  <mc:AlternateContent xmlns:mc="http://schemas.openxmlformats.org/markup-compatibility/2006">
-    <mc:Choice xmlns:p159="http://schemas.microsoft.com/office/powerpoint/2015/09/main" xmlns:p14="http://schemas.microsoft.com/office/powerpoint/2010/main" Requires="p159">
-      <p:transition p14:dur="2000" advClick="1"/>
-    </mc:Choice>
-    <mc:Fallback>
-      <p:transition advClick="1"/>
-    </mc:Fallback>
-  </mc:AlternateContent>
 </p:sld>
 </file>
 
 <file path=ppt/slides/slide8.xml><?xml version="1.0" encoding="utf-8"?>
-<p:sld xmlns:a="http://schemas.openxmlformats.org/drawingml/2006/main" xmlns:r="http://schemas.openxmlformats.org/officeDocument/2006/relationships" xmlns:p="http://schemas.openxmlformats.org/presentationml/2006/main" xmlns:m="http://schemas.openxmlformats.org/officeDocument/2006/math" xmlns:w="http://schemas.openxmlformats.org/wordprocessingml/2006/main" xmlns:mc="http://schemas.openxmlformats.org/markup-compatibility/2006" showMasterPhAnim="0" showMasterSp="1" show="1">
-  <p:cSld name="">
+<p:sld xmlns:a="http://schemas.openxmlformats.org/drawingml/2006/main" xmlns:r="http://schemas.openxmlformats.org/officeDocument/2006/relationships" xmlns:p="http://schemas.openxmlformats.org/presentationml/2006/main" showMasterPhAnim="0">
+  <p:cSld>
     <p:spTree>
       <p:nvGrpSpPr>
         <p:cNvPr id="1" name=""/>
@@ -7843,7 +7717,7 @@
                 </a:solidFill>
                 <a:latin typeface="Arial"/>
               </a:rPr>
-              <a:t>11</a:t>
+              <a:t>8</a:t>
             </a:fld>
             <a:endParaRPr lang="en-US" sz="1100" b="0" strike="noStrike" spc="-1">
               <a:latin typeface="Times New Roman"/>
@@ -8435,20 +8309,12 @@
   <p:clrMapOvr>
     <a:masterClrMapping/>
   </p:clrMapOvr>
-  <mc:AlternateContent xmlns:mc="http://schemas.openxmlformats.org/markup-compatibility/2006">
-    <mc:Choice xmlns:p159="http://schemas.microsoft.com/office/powerpoint/2015/09/main" xmlns:p14="http://schemas.microsoft.com/office/powerpoint/2010/main" Requires="p159">
-      <p:transition p14:dur="2000" advClick="1"/>
-    </mc:Choice>
-    <mc:Fallback>
-      <p:transition advClick="1"/>
-    </mc:Fallback>
-  </mc:AlternateContent>
 </p:sld>
 </file>
 
 <file path=ppt/slides/slide9.xml><?xml version="1.0" encoding="utf-8"?>
-<p:sld xmlns:a="http://schemas.openxmlformats.org/drawingml/2006/main" xmlns:r="http://schemas.openxmlformats.org/officeDocument/2006/relationships" xmlns:p="http://schemas.openxmlformats.org/presentationml/2006/main" xmlns:m="http://schemas.openxmlformats.org/officeDocument/2006/math" xmlns:w="http://schemas.openxmlformats.org/wordprocessingml/2006/main" xmlns:mc="http://schemas.openxmlformats.org/markup-compatibility/2006" showMasterPhAnim="0" showMasterSp="1" show="1">
-  <p:cSld name="">
+<p:sld xmlns:a="http://schemas.openxmlformats.org/drawingml/2006/main" xmlns:r="http://schemas.openxmlformats.org/officeDocument/2006/relationships" xmlns:p="http://schemas.openxmlformats.org/presentationml/2006/main" showMasterPhAnim="0">
+  <p:cSld>
     <p:spTree>
       <p:nvGrpSpPr>
         <p:cNvPr id="1" name=""/>
@@ -8864,7 +8730,7 @@
                 </a:solidFill>
                 <a:latin typeface="Arial"/>
               </a:rPr>
-              <a:t>12</a:t>
+              <a:t>9</a:t>
             </a:fld>
             <a:endParaRPr lang="en-US" sz="1100" b="0" strike="noStrike" spc="-1">
               <a:latin typeface="Times New Roman"/>
@@ -8876,31 +8742,74 @@
         <p:nvGraphicFramePr>
           <p:cNvPr id="1631897877" name="Table 8"/>
           <p:cNvGraphicFramePr>
-            <a:graphicFrameLocks xmlns:a="http://schemas.openxmlformats.org/drawingml/2006/main"/>
+            <a:graphicFrameLocks/>
           </p:cNvGraphicFramePr>
           <p:nvPr/>
         </p:nvGraphicFramePr>
-        <p:xfrm rot="0">
+        <p:xfrm>
           <a:off x="1371240" y="1695960"/>
           <a:ext cx="9862560" cy="3886200"/>
         </p:xfrm>
         <a:graphic>
           <a:graphicData uri="http://schemas.openxmlformats.org/drawingml/2006/table">
             <a:tbl>
-              <a:tblPr firstRow="0" firstCol="0" lastRow="0" lastCol="0" bandRow="0" bandCol="0"/>
+              <a:tblPr/>
               <a:tblGrid>
-                <a:gridCol w="1855440"/>
-                <a:gridCol w="1320120"/>
-                <a:gridCol w="1075680"/>
-                <a:gridCol w="1166400"/>
-                <a:gridCol w="1075680"/>
-                <a:gridCol w="1758240"/>
-                <a:gridCol w="1611000"/>
+                <a:gridCol w="1855440">
+                  <a:extLst>
+                    <a:ext uri="{9D8B030D-6E8A-4147-A177-3AD203B41FA5}">
+                      <a16:colId xmlns:a16="http://schemas.microsoft.com/office/drawing/2014/main" val="20000"/>
+                    </a:ext>
+                  </a:extLst>
+                </a:gridCol>
+                <a:gridCol w="1320120">
+                  <a:extLst>
+                    <a:ext uri="{9D8B030D-6E8A-4147-A177-3AD203B41FA5}">
+                      <a16:colId xmlns:a16="http://schemas.microsoft.com/office/drawing/2014/main" val="20001"/>
+                    </a:ext>
+                  </a:extLst>
+                </a:gridCol>
+                <a:gridCol w="1075680">
+                  <a:extLst>
+                    <a:ext uri="{9D8B030D-6E8A-4147-A177-3AD203B41FA5}">
+                      <a16:colId xmlns:a16="http://schemas.microsoft.com/office/drawing/2014/main" val="20002"/>
+                    </a:ext>
+                  </a:extLst>
+                </a:gridCol>
+                <a:gridCol w="1166400">
+                  <a:extLst>
+                    <a:ext uri="{9D8B030D-6E8A-4147-A177-3AD203B41FA5}">
+                      <a16:colId xmlns:a16="http://schemas.microsoft.com/office/drawing/2014/main" val="20003"/>
+                    </a:ext>
+                  </a:extLst>
+                </a:gridCol>
+                <a:gridCol w="1075680">
+                  <a:extLst>
+                    <a:ext uri="{9D8B030D-6E8A-4147-A177-3AD203B41FA5}">
+                      <a16:colId xmlns:a16="http://schemas.microsoft.com/office/drawing/2014/main" val="20004"/>
+                    </a:ext>
+                  </a:extLst>
+                </a:gridCol>
+                <a:gridCol w="1758240">
+                  <a:extLst>
+                    <a:ext uri="{9D8B030D-6E8A-4147-A177-3AD203B41FA5}">
+                      <a16:colId xmlns:a16="http://schemas.microsoft.com/office/drawing/2014/main" val="20005"/>
+                    </a:ext>
+                  </a:extLst>
+                </a:gridCol>
+                <a:gridCol w="1611000">
+                  <a:extLst>
+                    <a:ext uri="{9D8B030D-6E8A-4147-A177-3AD203B41FA5}">
+                      <a16:colId xmlns:a16="http://schemas.microsoft.com/office/drawing/2014/main" val="20006"/>
+                    </a:ext>
+                  </a:extLst>
+                </a:gridCol>
               </a:tblGrid>
               <a:tr h="438840">
                 <a:tc gridSpan="7">
                   <a:txBody>
                     <a:bodyPr/>
+                    <a:lstStyle/>
                     <a:p>
                       <a:pPr algn="ctr">
                         <a:lnSpc>
@@ -8960,56 +8869,74 @@
                 <a:tc hMerge="1">
                   <a:txBody>
                     <a:bodyPr/>
+                    <a:lstStyle/>
                     <a:p>
                       <a:endParaRPr/>
                     </a:p>
                   </a:txBody>
+                  <a:tcPr/>
                 </a:tc>
                 <a:tc hMerge="1">
                   <a:txBody>
                     <a:bodyPr/>
+                    <a:lstStyle/>
                     <a:p>
                       <a:endParaRPr/>
                     </a:p>
                   </a:txBody>
+                  <a:tcPr/>
                 </a:tc>
                 <a:tc hMerge="1">
                   <a:txBody>
                     <a:bodyPr/>
+                    <a:lstStyle/>
                     <a:p>
                       <a:endParaRPr/>
                     </a:p>
                   </a:txBody>
+                  <a:tcPr/>
                 </a:tc>
                 <a:tc hMerge="1">
                   <a:txBody>
                     <a:bodyPr/>
+                    <a:lstStyle/>
                     <a:p>
                       <a:endParaRPr/>
                     </a:p>
                   </a:txBody>
+                  <a:tcPr/>
                 </a:tc>
                 <a:tc hMerge="1">
                   <a:txBody>
                     <a:bodyPr/>
+                    <a:lstStyle/>
                     <a:p>
                       <a:endParaRPr/>
                     </a:p>
                   </a:txBody>
+                  <a:tcPr/>
                 </a:tc>
                 <a:tc hMerge="1">
                   <a:txBody>
                     <a:bodyPr/>
+                    <a:lstStyle/>
                     <a:p>
                       <a:endParaRPr/>
                     </a:p>
                   </a:txBody>
+                  <a:tcPr/>
                 </a:tc>
+                <a:extLst>
+                  <a:ext uri="{0D108BD9-81ED-4DB2-BD59-A6C34878D82A}">
+                    <a16:rowId xmlns:a16="http://schemas.microsoft.com/office/drawing/2014/main" val="10000"/>
+                  </a:ext>
+                </a:extLst>
               </a:tr>
               <a:tr h="789840">
                 <a:tc>
                   <a:txBody>
                     <a:bodyPr/>
+                    <a:lstStyle/>
                     <a:p>
                       <a:pPr>
                         <a:lnSpc>
@@ -9060,6 +8987,7 @@
                 <a:tc>
                   <a:txBody>
                     <a:bodyPr/>
+                    <a:lstStyle/>
                     <a:p>
                       <a:pPr>
                         <a:lnSpc>
@@ -9110,6 +9038,7 @@
                 <a:tc>
                   <a:txBody>
                     <a:bodyPr/>
+                    <a:lstStyle/>
                     <a:p>
                       <a:pPr>
                         <a:lnSpc>
@@ -9160,6 +9089,7 @@
                 <a:tc>
                   <a:txBody>
                     <a:bodyPr/>
+                    <a:lstStyle/>
                     <a:p>
                       <a:pPr>
                         <a:lnSpc>
@@ -9210,6 +9140,7 @@
                 <a:tc>
                   <a:txBody>
                     <a:bodyPr/>
+                    <a:lstStyle/>
                     <a:p>
                       <a:pPr>
                         <a:lnSpc>
@@ -9260,6 +9191,7 @@
                 <a:tc>
                   <a:txBody>
                     <a:bodyPr/>
+                    <a:lstStyle/>
                     <a:p>
                       <a:pPr>
                         <a:lnSpc>
@@ -9330,6 +9262,7 @@
                 <a:tc>
                   <a:txBody>
                     <a:bodyPr/>
+                    <a:lstStyle/>
                     <a:p>
                       <a:pPr>
                         <a:lnSpc>
@@ -9377,11 +9310,17 @@
                     </a:solidFill>
                   </a:tcPr>
                 </a:tc>
+                <a:extLst>
+                  <a:ext uri="{0D108BD9-81ED-4DB2-BD59-A6C34878D82A}">
+                    <a16:rowId xmlns:a16="http://schemas.microsoft.com/office/drawing/2014/main" val="10001"/>
+                  </a:ext>
+                </a:extLst>
               </a:tr>
               <a:tr h="438840">
                 <a:tc>
                   <a:txBody>
                     <a:bodyPr/>
+                    <a:lstStyle/>
                     <a:p>
                       <a:pPr>
                         <a:lnSpc>
@@ -9432,6 +9371,7 @@
                 <a:tc>
                   <a:txBody>
                     <a:bodyPr/>
+                    <a:lstStyle/>
                     <a:p>
                       <a:pPr algn="r">
                         <a:lnSpc>
@@ -9482,6 +9422,7 @@
                 <a:tc>
                   <a:txBody>
                     <a:bodyPr/>
+                    <a:lstStyle/>
                     <a:p>
                       <a:pPr algn="r">
                         <a:lnSpc>
@@ -9532,6 +9473,7 @@
                 <a:tc>
                   <a:txBody>
                     <a:bodyPr/>
+                    <a:lstStyle/>
                     <a:p>
                       <a:pPr algn="r">
                         <a:lnSpc>
@@ -9582,6 +9524,7 @@
                 <a:tc>
                   <a:txBody>
                     <a:bodyPr/>
+                    <a:lstStyle/>
                     <a:p>
                       <a:pPr algn="r">
                         <a:lnSpc>
@@ -9632,6 +9575,7 @@
                 <a:tc>
                   <a:txBody>
                     <a:bodyPr/>
+                    <a:lstStyle/>
                     <a:p>
                       <a:pPr algn="r">
                         <a:lnSpc>
@@ -9682,6 +9626,7 @@
                 <a:tc>
                   <a:txBody>
                     <a:bodyPr/>
+                    <a:lstStyle/>
                     <a:p>
                       <a:pPr algn="r">
                         <a:lnSpc>
@@ -9729,11 +9674,17 @@
                     </a:solidFill>
                   </a:tcPr>
                 </a:tc>
+                <a:extLst>
+                  <a:ext uri="{0D108BD9-81ED-4DB2-BD59-A6C34878D82A}">
+                    <a16:rowId xmlns:a16="http://schemas.microsoft.com/office/drawing/2014/main" val="10002"/>
+                  </a:ext>
+                </a:extLst>
               </a:tr>
               <a:tr h="438840">
                 <a:tc>
                   <a:txBody>
                     <a:bodyPr/>
+                    <a:lstStyle/>
                     <a:p>
                       <a:pPr>
                         <a:lnSpc>
@@ -9784,6 +9735,7 @@
                 <a:tc>
                   <a:txBody>
                     <a:bodyPr/>
+                    <a:lstStyle/>
                     <a:p>
                       <a:pPr algn="r">
                         <a:lnSpc>
@@ -9834,6 +9786,7 @@
                 <a:tc>
                   <a:txBody>
                     <a:bodyPr/>
+                    <a:lstStyle/>
                     <a:p>
                       <a:pPr algn="r">
                         <a:lnSpc>
@@ -9884,6 +9837,7 @@
                 <a:tc>
                   <a:txBody>
                     <a:bodyPr/>
+                    <a:lstStyle/>
                     <a:p>
                       <a:pPr algn="r">
                         <a:lnSpc>
@@ -9934,6 +9888,7 @@
                 <a:tc>
                   <a:txBody>
                     <a:bodyPr/>
+                    <a:lstStyle/>
                     <a:p>
                       <a:pPr algn="r">
                         <a:lnSpc>
@@ -9984,6 +9939,7 @@
                 <a:tc>
                   <a:txBody>
                     <a:bodyPr/>
+                    <a:lstStyle/>
                     <a:p>
                       <a:pPr algn="r">
                         <a:lnSpc>
@@ -10034,6 +9990,7 @@
                 <a:tc>
                   <a:txBody>
                     <a:bodyPr/>
+                    <a:lstStyle/>
                     <a:p>
                       <a:pPr algn="r">
                         <a:lnSpc>
@@ -10081,11 +10038,17 @@
                     </a:solidFill>
                   </a:tcPr>
                 </a:tc>
+                <a:extLst>
+                  <a:ext uri="{0D108BD9-81ED-4DB2-BD59-A6C34878D82A}">
+                    <a16:rowId xmlns:a16="http://schemas.microsoft.com/office/drawing/2014/main" val="10003"/>
+                  </a:ext>
+                </a:extLst>
               </a:tr>
               <a:tr h="438840">
                 <a:tc>
                   <a:txBody>
                     <a:bodyPr/>
+                    <a:lstStyle/>
                     <a:p>
                       <a:pPr>
                         <a:lnSpc>
@@ -10136,6 +10099,7 @@
                 <a:tc>
                   <a:txBody>
                     <a:bodyPr/>
+                    <a:lstStyle/>
                     <a:p>
                       <a:pPr algn="r">
                         <a:lnSpc>
@@ -10186,6 +10150,7 @@
                 <a:tc>
                   <a:txBody>
                     <a:bodyPr/>
+                    <a:lstStyle/>
                     <a:p>
                       <a:pPr algn="r">
                         <a:lnSpc>
@@ -10236,6 +10201,7 @@
                 <a:tc>
                   <a:txBody>
                     <a:bodyPr/>
+                    <a:lstStyle/>
                     <a:p>
                       <a:pPr algn="r">
                         <a:lnSpc>
@@ -10286,6 +10252,7 @@
                 <a:tc>
                   <a:txBody>
                     <a:bodyPr/>
+                    <a:lstStyle/>
                     <a:p>
                       <a:pPr algn="r">
                         <a:lnSpc>
@@ -10336,6 +10303,7 @@
                 <a:tc>
                   <a:txBody>
                     <a:bodyPr/>
+                    <a:lstStyle/>
                     <a:p>
                       <a:pPr algn="r">
                         <a:lnSpc>
@@ -10386,6 +10354,7 @@
                 <a:tc>
                   <a:txBody>
                     <a:bodyPr/>
+                    <a:lstStyle/>
                     <a:p>
                       <a:pPr algn="r">
                         <a:lnSpc>
@@ -10433,11 +10402,17 @@
                     </a:solidFill>
                   </a:tcPr>
                 </a:tc>
+                <a:extLst>
+                  <a:ext uri="{0D108BD9-81ED-4DB2-BD59-A6C34878D82A}">
+                    <a16:rowId xmlns:a16="http://schemas.microsoft.com/office/drawing/2014/main" val="10004"/>
+                  </a:ext>
+                </a:extLst>
               </a:tr>
               <a:tr h="438840">
                 <a:tc>
                   <a:txBody>
                     <a:bodyPr/>
+                    <a:lstStyle/>
                     <a:p>
                       <a:pPr>
                         <a:lnSpc>
@@ -10488,6 +10463,7 @@
                 <a:tc>
                   <a:txBody>
                     <a:bodyPr/>
+                    <a:lstStyle/>
                     <a:p>
                       <a:pPr algn="r">
                         <a:lnSpc>
@@ -10538,6 +10514,7 @@
                 <a:tc>
                   <a:txBody>
                     <a:bodyPr/>
+                    <a:lstStyle/>
                     <a:p>
                       <a:pPr algn="r">
                         <a:lnSpc>
@@ -10588,6 +10565,7 @@
                 <a:tc>
                   <a:txBody>
                     <a:bodyPr/>
+                    <a:lstStyle/>
                     <a:p>
                       <a:pPr algn="r">
                         <a:lnSpc>
@@ -10638,6 +10616,7 @@
                 <a:tc>
                   <a:txBody>
                     <a:bodyPr/>
+                    <a:lstStyle/>
                     <a:p>
                       <a:pPr algn="r">
                         <a:lnSpc>
@@ -10688,6 +10667,7 @@
                 <a:tc>
                   <a:txBody>
                     <a:bodyPr/>
+                    <a:lstStyle/>
                     <a:p>
                       <a:pPr algn="r">
                         <a:lnSpc>
@@ -10738,6 +10718,7 @@
                 <a:tc>
                   <a:txBody>
                     <a:bodyPr/>
+                    <a:lstStyle/>
                     <a:p>
                       <a:pPr algn="r">
                         <a:lnSpc>
@@ -10785,11 +10766,17 @@
                     </a:solidFill>
                   </a:tcPr>
                 </a:tc>
+                <a:extLst>
+                  <a:ext uri="{0D108BD9-81ED-4DB2-BD59-A6C34878D82A}">
+                    <a16:rowId xmlns:a16="http://schemas.microsoft.com/office/drawing/2014/main" val="10005"/>
+                  </a:ext>
+                </a:extLst>
               </a:tr>
               <a:tr h="438840">
                 <a:tc>
                   <a:txBody>
                     <a:bodyPr/>
+                    <a:lstStyle/>
                     <a:p>
                       <a:pPr>
                         <a:lnSpc>
@@ -10840,6 +10827,7 @@
                 <a:tc>
                   <a:txBody>
                     <a:bodyPr/>
+                    <a:lstStyle/>
                     <a:p>
                       <a:pPr algn="r">
                         <a:lnSpc>
@@ -10890,6 +10878,7 @@
                 <a:tc>
                   <a:txBody>
                     <a:bodyPr/>
+                    <a:lstStyle/>
                     <a:p>
                       <a:pPr algn="r">
                         <a:lnSpc>
@@ -10940,6 +10929,7 @@
                 <a:tc>
                   <a:txBody>
                     <a:bodyPr/>
+                    <a:lstStyle/>
                     <a:p>
                       <a:pPr algn="r">
                         <a:lnSpc>
@@ -10990,6 +10980,7 @@
                 <a:tc>
                   <a:txBody>
                     <a:bodyPr/>
+                    <a:lstStyle/>
                     <a:p>
                       <a:pPr algn="r">
                         <a:lnSpc>
@@ -11040,6 +11031,7 @@
                 <a:tc>
                   <a:txBody>
                     <a:bodyPr/>
+                    <a:lstStyle/>
                     <a:p>
                       <a:pPr algn="r">
                         <a:lnSpc>
@@ -11090,6 +11082,7 @@
                 <a:tc>
                   <a:txBody>
                     <a:bodyPr/>
+                    <a:lstStyle/>
                     <a:p>
                       <a:pPr algn="r">
                         <a:lnSpc>
@@ -11137,11 +11130,17 @@
                     </a:solidFill>
                   </a:tcPr>
                 </a:tc>
+                <a:extLst>
+                  <a:ext uri="{0D108BD9-81ED-4DB2-BD59-A6C34878D82A}">
+                    <a16:rowId xmlns:a16="http://schemas.microsoft.com/office/drawing/2014/main" val="10006"/>
+                  </a:ext>
+                </a:extLst>
               </a:tr>
               <a:tr h="440280">
                 <a:tc>
                   <a:txBody>
                     <a:bodyPr/>
+                    <a:lstStyle/>
                     <a:p>
                       <a:pPr>
                         <a:lnSpc>
@@ -11192,6 +11191,7 @@
                 <a:tc>
                   <a:txBody>
                     <a:bodyPr/>
+                    <a:lstStyle/>
                     <a:p>
                       <a:pPr algn="r">
                         <a:lnSpc>
@@ -11242,6 +11242,7 @@
                 <a:tc>
                   <a:txBody>
                     <a:bodyPr/>
+                    <a:lstStyle/>
                     <a:p>
                       <a:pPr algn="r">
                         <a:lnSpc>
@@ -11292,6 +11293,7 @@
                 <a:tc>
                   <a:txBody>
                     <a:bodyPr/>
+                    <a:lstStyle/>
                     <a:p>
                       <a:pPr algn="r">
                         <a:lnSpc>
@@ -11342,6 +11344,7 @@
                 <a:tc>
                   <a:txBody>
                     <a:bodyPr/>
+                    <a:lstStyle/>
                     <a:p>
                       <a:pPr algn="r">
                         <a:lnSpc>
@@ -11392,6 +11395,7 @@
                 <a:tc>
                   <a:txBody>
                     <a:bodyPr/>
+                    <a:lstStyle/>
                     <a:p>
                       <a:pPr algn="r">
                         <a:lnSpc>
@@ -11442,6 +11446,7 @@
                 <a:tc>
                   <a:txBody>
                     <a:bodyPr/>
+                    <a:lstStyle/>
                     <a:p>
                       <a:pPr algn="r">
                         <a:lnSpc>
@@ -11489,6 +11494,11 @@
                     </a:solidFill>
                   </a:tcPr>
                 </a:tc>
+                <a:extLst>
+                  <a:ext uri="{0D108BD9-81ED-4DB2-BD59-A6C34878D82A}">
+                    <a16:rowId xmlns:a16="http://schemas.microsoft.com/office/drawing/2014/main" val="10007"/>
+                  </a:ext>
+                </a:extLst>
               </a:tr>
             </a:tbl>
           </a:graphicData>
@@ -11575,19 +11585,11 @@
   <p:clrMapOvr>
     <a:masterClrMapping/>
   </p:clrMapOvr>
-  <mc:AlternateContent xmlns:mc="http://schemas.openxmlformats.org/markup-compatibility/2006">
-    <mc:Choice xmlns:p159="http://schemas.microsoft.com/office/powerpoint/2015/09/main" xmlns:p14="http://schemas.microsoft.com/office/powerpoint/2010/main" Requires="p159">
-      <p:transition p14:dur="2000" advClick="1"/>
-    </mc:Choice>
-    <mc:Fallback>
-      <p:transition advClick="1"/>
-    </mc:Fallback>
-  </mc:AlternateContent>
 </p:sld>
 </file>
 
 <file path=ppt/theme/theme1.xml><?xml version="1.0" encoding="utf-8"?>
-<a:theme xmlns:a="http://schemas.openxmlformats.org/drawingml/2006/main" xmlns:r="http://schemas.openxmlformats.org/officeDocument/2006/relationships" xmlns:p="http://schemas.openxmlformats.org/presentationml/2006/main" name="Herts Theme">
+<a:theme xmlns:a="http://schemas.openxmlformats.org/drawingml/2006/main" name="Herts Theme">
   <a:themeElements>
     <a:clrScheme name="Custom 2">
       <a:dk1>
@@ -11778,11 +11780,12 @@
     </a:fmtScheme>
   </a:themeElements>
   <a:objectDefaults/>
+  <a:extraClrSchemeLst/>
 </a:theme>
 </file>
 
 <file path=ppt/theme/theme2.xml><?xml version="1.0" encoding="utf-8"?>
-<a:theme xmlns:a="http://schemas.openxmlformats.org/drawingml/2006/main" xmlns:r="http://schemas.openxmlformats.org/officeDocument/2006/relationships" xmlns:p="http://schemas.openxmlformats.org/presentationml/2006/main" name="Office Theme">
+<a:theme xmlns:a="http://schemas.openxmlformats.org/drawingml/2006/main" name="Office Theme">
   <a:themeElements>
     <a:clrScheme name="Office">
       <a:dk1>
@@ -11973,18 +11976,11 @@
     </a:fmtScheme>
   </a:themeElements>
   <a:objectDefaults/>
+  <a:extraClrSchemeLst/>
 </a:theme>
 </file>
 
 <file path=customXml/item1.xml><?xml version="1.0" encoding="utf-8"?>
-<p:properties xmlns:p="http://schemas.microsoft.com/office/2006/metadata/properties" xmlns:xsi="http://www.w3.org/2001/XMLSchema-instance" xmlns:pc="http://schemas.microsoft.com/office/infopath/2007/PartnerControls">
-  <documentManagement>
-    <Information xmlns="4ad138b4-2b68-4b70-945d-07f8f18b1c9a" xsi:nil="true"/>
-  </documentManagement>
-</p:properties>
-</file>
-
-<file path=customXml/item2.xml><?xml version="1.0" encoding="utf-8"?>
 <ct:contentTypeSchema xmlns:ct="http://schemas.microsoft.com/office/2006/metadata/contentType" xmlns:ma="http://schemas.microsoft.com/office/2006/metadata/properties/metaAttributes" ct:_="" ma:_="" ma:contentTypeName="Document" ma:contentTypeID="0x01010026DBA85F447B164191BB36C258697B67" ma:contentTypeVersion="14" ma:contentTypeDescription="Create a new document." ma:contentTypeScope="" ma:versionID="ea511d05ca7f895fe9556935b5c9af34">
   <xsd:schema xmlns:xsd="http://www.w3.org/2001/XMLSchema" xmlns:xs="http://www.w3.org/2001/XMLSchema" xmlns:p="http://schemas.microsoft.com/office/2006/metadata/properties" xmlns:ns2="4ad138b4-2b68-4b70-945d-07f8f18b1c9a" xmlns:ns3="3c474641-ec36-472f-b125-6b1b0910eaa4" targetNamespace="http://schemas.microsoft.com/office/2006/metadata/properties" ma:root="true" ma:fieldsID="662270106d7a7e100bcac2c5f8d29899" ns2:_="" ns3:_="">
     <xsd:import namespace="4ad138b4-2b68-4b70-945d-07f8f18b1c9a"/>
@@ -12207,6 +12203,14 @@
 </ct:contentTypeSchema>
 </file>
 
+<file path=customXml/item2.xml><?xml version="1.0" encoding="utf-8"?>
+<p:properties xmlns:p="http://schemas.microsoft.com/office/2006/metadata/properties" xmlns:xsi="http://www.w3.org/2001/XMLSchema-instance" xmlns:pc="http://schemas.microsoft.com/office/infopath/2007/PartnerControls">
+  <documentManagement>
+    <Information xmlns="4ad138b4-2b68-4b70-945d-07f8f18b1c9a" xsi:nil="true"/>
+  </documentManagement>
+</p:properties>
+</file>
+
 <file path=customXml/item3.xml><?xml version="1.0" encoding="utf-8"?>
 <?mso-contentType ?>
 <FormTemplates xmlns="http://schemas.microsoft.com/sharepoint/v3/contenttype/forms">
@@ -12217,24 +12221,6 @@
 </file>
 
 <file path=customXml/itemProps1.xml><?xml version="1.0" encoding="utf-8"?>
-<ds:datastoreItem xmlns:ds="http://schemas.openxmlformats.org/officeDocument/2006/customXml" ds:itemID="{EDD1FC41-23C7-41B0-B5F9-BF4CD38AD2ED}">
-  <ds:schemaRefs>
-    <ds:schemaRef ds:uri="3c474641-ec36-472f-b125-6b1b0910eaa4"/>
-    <ds:schemaRef ds:uri="4ad138b4-2b68-4b70-945d-07f8f18b1c9a"/>
-    <ds:schemaRef ds:uri="http://purl.org/dc/dcmitype/"/>
-    <ds:schemaRef ds:uri="http://purl.org/dc/elements/1.1/"/>
-    <ds:schemaRef ds:uri="http://purl.org/dc/terms/"/>
-    <ds:schemaRef ds:uri="http://schemas.microsoft.com/office/2006/documentManagement/types"/>
-    <ds:schemaRef ds:uri="http://schemas.microsoft.com/office/2006/metadata/properties"/>
-    <ds:schemaRef ds:uri="http://schemas.microsoft.com/office/infopath/2007/PartnerControls"/>
-    <ds:schemaRef ds:uri="http://schemas.openxmlformats.org/package/2006/metadata/core-properties"/>
-    <ds:schemaRef ds:uri="http://www.w3.org/XML/1998/namespace"/>
-    <ds:schemaRef ds:uri="http://www.w3.org/2001/XMLSchema-instance"/>
-  </ds:schemaRefs>
-</ds:datastoreItem>
-</file>
-
-<file path=customXml/itemProps2.xml><?xml version="1.0" encoding="utf-8"?>
 <ds:datastoreItem xmlns:ds="http://schemas.openxmlformats.org/officeDocument/2006/customXml" ds:itemID="{421B8C57-903D-4D0E-8336-7B512F760CD1}">
   <ds:schemaRefs>
     <ds:schemaRef ds:uri="3c474641-ec36-472f-b125-6b1b0910eaa4"/>
@@ -12254,6 +12240,24 @@
 </ds:datastoreItem>
 </file>
 
+<file path=customXml/itemProps2.xml><?xml version="1.0" encoding="utf-8"?>
+<ds:datastoreItem xmlns:ds="http://schemas.openxmlformats.org/officeDocument/2006/customXml" ds:itemID="{EDD1FC41-23C7-41B0-B5F9-BF4CD38AD2ED}">
+  <ds:schemaRefs>
+    <ds:schemaRef ds:uri="3c474641-ec36-472f-b125-6b1b0910eaa4"/>
+    <ds:schemaRef ds:uri="4ad138b4-2b68-4b70-945d-07f8f18b1c9a"/>
+    <ds:schemaRef ds:uri="http://purl.org/dc/dcmitype/"/>
+    <ds:schemaRef ds:uri="http://purl.org/dc/elements/1.1/"/>
+    <ds:schemaRef ds:uri="http://purl.org/dc/terms/"/>
+    <ds:schemaRef ds:uri="http://schemas.microsoft.com/office/2006/documentManagement/types"/>
+    <ds:schemaRef ds:uri="http://schemas.microsoft.com/office/2006/metadata/properties"/>
+    <ds:schemaRef ds:uri="http://schemas.microsoft.com/office/infopath/2007/PartnerControls"/>
+    <ds:schemaRef ds:uri="http://schemas.openxmlformats.org/package/2006/metadata/core-properties"/>
+    <ds:schemaRef ds:uri="http://www.w3.org/XML/1998/namespace"/>
+    <ds:schemaRef ds:uri="http://www.w3.org/2001/XMLSchema-instance"/>
+  </ds:schemaRefs>
+</ds:datastoreItem>
+</file>
+
 <file path=customXml/itemProps3.xml><?xml version="1.0" encoding="utf-8"?>
 <ds:datastoreItem xmlns:ds="http://schemas.openxmlformats.org/officeDocument/2006/customXml" ds:itemID="{91C521DD-2673-4EE6-BB9B-DC5C3320FFBB}">
   <ds:schemaRefs>

</xml_diff>